<commit_message>
Updated Report and Presentation
</commit_message>
<xml_diff>
--- a/AI TermProject Presentation.pptx
+++ b/AI TermProject Presentation.pptx
@@ -7,6 +7,23 @@
   <p:sldIdLst>
     <p:sldId id="256" r:id="rId2"/>
     <p:sldId id="257" r:id="rId3"/>
+    <p:sldId id="262" r:id="rId4"/>
+    <p:sldId id="258" r:id="rId5"/>
+    <p:sldId id="259" r:id="rId6"/>
+    <p:sldId id="260" r:id="rId7"/>
+    <p:sldId id="269" r:id="rId8"/>
+    <p:sldId id="263" r:id="rId9"/>
+    <p:sldId id="264" r:id="rId10"/>
+    <p:sldId id="270" r:id="rId11"/>
+    <p:sldId id="265" r:id="rId12"/>
+    <p:sldId id="271" r:id="rId13"/>
+    <p:sldId id="266" r:id="rId14"/>
+    <p:sldId id="273" r:id="rId15"/>
+    <p:sldId id="272" r:id="rId16"/>
+    <p:sldId id="267" r:id="rId17"/>
+    <p:sldId id="268" r:id="rId18"/>
+    <p:sldId id="276" r:id="rId19"/>
+    <p:sldId id="277" r:id="rId20"/>
   </p:sldIdLst>
   <p:sldSz cx="12192000" cy="6858000"/>
   <p:notesSz cx="6858000" cy="9144000"/>
@@ -105,6 +122,11 @@
       </a:defRPr>
     </a:lvl9pPr>
   </p:defaultTextStyle>
+  <p:extLst>
+    <p:ext uri="{EFAFB233-063F-42B5-8137-9DF3F51BA10A}">
+      <p15:sldGuideLst xmlns:p15="http://schemas.microsoft.com/office/powerpoint/2012/main"/>
+    </p:ext>
+  </p:extLst>
 </p:presentation>
 </file>
 
@@ -610,7 +632,7 @@
           <a:p>
             <a:fld id="{8D0D1485-7662-4977-BABF-65B17E5E34F2}" type="datetimeFigureOut">
               <a:rPr lang="en-US" smtClean="0"/>
-              <a:t>4/5/2024</a:t>
+              <a:t>4/16/2024</a:t>
             </a:fld>
             <a:endParaRPr lang="en-US"/>
           </a:p>
@@ -906,7 +928,7 @@
           <a:p>
             <a:fld id="{8D0D1485-7662-4977-BABF-65B17E5E34F2}" type="datetimeFigureOut">
               <a:rPr lang="en-US" smtClean="0"/>
-              <a:t>4/5/2024</a:t>
+              <a:t>4/16/2024</a:t>
             </a:fld>
             <a:endParaRPr lang="en-US"/>
           </a:p>
@@ -1154,7 +1176,7 @@
           <a:p>
             <a:fld id="{8D0D1485-7662-4977-BABF-65B17E5E34F2}" type="datetimeFigureOut">
               <a:rPr lang="en-US" smtClean="0"/>
-              <a:t>4/5/2024</a:t>
+              <a:t>4/16/2024</a:t>
             </a:fld>
             <a:endParaRPr lang="en-US"/>
           </a:p>
@@ -1694,7 +1716,7 @@
           <a:p>
             <a:fld id="{8D0D1485-7662-4977-BABF-65B17E5E34F2}" type="datetimeFigureOut">
               <a:rPr lang="en-US" smtClean="0"/>
-              <a:t>4/5/2024</a:t>
+              <a:t>4/16/2024</a:t>
             </a:fld>
             <a:endParaRPr lang="en-US"/>
           </a:p>
@@ -1942,7 +1964,7 @@
           <a:p>
             <a:fld id="{8D0D1485-7662-4977-BABF-65B17E5E34F2}" type="datetimeFigureOut">
               <a:rPr lang="en-US" smtClean="0"/>
-              <a:t>4/5/2024</a:t>
+              <a:t>4/16/2024</a:t>
             </a:fld>
             <a:endParaRPr lang="en-US"/>
           </a:p>
@@ -2474,7 +2496,7 @@
           <a:p>
             <a:fld id="{8D0D1485-7662-4977-BABF-65B17E5E34F2}" type="datetimeFigureOut">
               <a:rPr lang="en-US" smtClean="0"/>
-              <a:t>4/5/2024</a:t>
+              <a:t>4/16/2024</a:t>
             </a:fld>
             <a:endParaRPr lang="en-US"/>
           </a:p>
@@ -2771,7 +2793,7 @@
           <a:p>
             <a:fld id="{8D0D1485-7662-4977-BABF-65B17E5E34F2}" type="datetimeFigureOut">
               <a:rPr lang="en-US" smtClean="0"/>
-              <a:t>4/5/2024</a:t>
+              <a:t>4/16/2024</a:t>
             </a:fld>
             <a:endParaRPr lang="en-US"/>
           </a:p>
@@ -2945,7 +2967,7 @@
           <a:p>
             <a:fld id="{8D0D1485-7662-4977-BABF-65B17E5E34F2}" type="datetimeFigureOut">
               <a:rPr lang="en-US" smtClean="0"/>
-              <a:t>4/5/2024</a:t>
+              <a:t>4/16/2024</a:t>
             </a:fld>
             <a:endParaRPr lang="en-US"/>
           </a:p>
@@ -3125,7 +3147,7 @@
           <a:p>
             <a:fld id="{8D0D1485-7662-4977-BABF-65B17E5E34F2}" type="datetimeFigureOut">
               <a:rPr lang="en-US" smtClean="0"/>
-              <a:t>4/5/2024</a:t>
+              <a:t>4/16/2024</a:t>
             </a:fld>
             <a:endParaRPr lang="en-US"/>
           </a:p>
@@ -3295,7 +3317,7 @@
           <a:p>
             <a:fld id="{8D0D1485-7662-4977-BABF-65B17E5E34F2}" type="datetimeFigureOut">
               <a:rPr lang="en-US" smtClean="0"/>
-              <a:t>4/5/2024</a:t>
+              <a:t>4/16/2024</a:t>
             </a:fld>
             <a:endParaRPr lang="en-US"/>
           </a:p>
@@ -3546,7 +3568,7 @@
           <a:p>
             <a:fld id="{8D0D1485-7662-4977-BABF-65B17E5E34F2}" type="datetimeFigureOut">
               <a:rPr lang="en-US" smtClean="0"/>
-              <a:t>4/5/2024</a:t>
+              <a:t>4/16/2024</a:t>
             </a:fld>
             <a:endParaRPr lang="en-US"/>
           </a:p>
@@ -3843,7 +3865,7 @@
           <a:p>
             <a:fld id="{8D0D1485-7662-4977-BABF-65B17E5E34F2}" type="datetimeFigureOut">
               <a:rPr lang="en-US" smtClean="0"/>
-              <a:t>4/5/2024</a:t>
+              <a:t>4/16/2024</a:t>
             </a:fld>
             <a:endParaRPr lang="en-US"/>
           </a:p>
@@ -4285,7 +4307,7 @@
           <a:p>
             <a:fld id="{8D0D1485-7662-4977-BABF-65B17E5E34F2}" type="datetimeFigureOut">
               <a:rPr lang="en-US" smtClean="0"/>
-              <a:t>4/5/2024</a:t>
+              <a:t>4/16/2024</a:t>
             </a:fld>
             <a:endParaRPr lang="en-US"/>
           </a:p>
@@ -4403,7 +4425,7 @@
           <a:p>
             <a:fld id="{8D0D1485-7662-4977-BABF-65B17E5E34F2}" type="datetimeFigureOut">
               <a:rPr lang="en-US" smtClean="0"/>
-              <a:t>4/5/2024</a:t>
+              <a:t>4/16/2024</a:t>
             </a:fld>
             <a:endParaRPr lang="en-US"/>
           </a:p>
@@ -4498,7 +4520,7 @@
           <a:p>
             <a:fld id="{8D0D1485-7662-4977-BABF-65B17E5E34F2}" type="datetimeFigureOut">
               <a:rPr lang="en-US" smtClean="0"/>
-              <a:t>4/5/2024</a:t>
+              <a:t>4/16/2024</a:t>
             </a:fld>
             <a:endParaRPr lang="en-US"/>
           </a:p>
@@ -4781,7 +4803,7 @@
           <a:p>
             <a:fld id="{8D0D1485-7662-4977-BABF-65B17E5E34F2}" type="datetimeFigureOut">
               <a:rPr lang="en-US" smtClean="0"/>
-              <a:t>4/5/2024</a:t>
+              <a:t>4/16/2024</a:t>
             </a:fld>
             <a:endParaRPr lang="en-US"/>
           </a:p>
@@ -5072,7 +5094,7 @@
           <a:p>
             <a:fld id="{8D0D1485-7662-4977-BABF-65B17E5E34F2}" type="datetimeFigureOut">
               <a:rPr lang="en-US" smtClean="0"/>
-              <a:t>4/5/2024</a:t>
+              <a:t>4/16/2024</a:t>
             </a:fld>
             <a:endParaRPr lang="en-US"/>
           </a:p>
@@ -5602,7 +5624,7 @@
           <a:p>
             <a:fld id="{8D0D1485-7662-4977-BABF-65B17E5E34F2}" type="datetimeFigureOut">
               <a:rPr lang="en-US" smtClean="0"/>
-              <a:t>4/5/2024</a:t>
+              <a:t>4/16/2024</a:t>
             </a:fld>
             <a:endParaRPr lang="en-US"/>
           </a:p>
@@ -6217,6 +6239,854 @@
 </p:sld>
 </file>
 
+<file path=ppt/slides/slide10.xml><?xml version="1.0" encoding="utf-8"?>
+<p:sld xmlns:a="http://schemas.openxmlformats.org/drawingml/2006/main" xmlns:r="http://schemas.openxmlformats.org/officeDocument/2006/relationships" xmlns:p="http://schemas.openxmlformats.org/presentationml/2006/main">
+  <p:cSld>
+    <p:spTree>
+      <p:nvGrpSpPr>
+        <p:cNvPr id="1" name=""/>
+        <p:cNvGrpSpPr/>
+        <p:nvPr/>
+      </p:nvGrpSpPr>
+      <p:grpSpPr>
+        <a:xfrm>
+          <a:off x="0" y="0"/>
+          <a:ext cx="0" cy="0"/>
+          <a:chOff x="0" y="0"/>
+          <a:chExt cx="0" cy="0"/>
+        </a:xfrm>
+      </p:grpSpPr>
+      <p:sp>
+        <p:nvSpPr>
+          <p:cNvPr id="2" name="Title 1">
+            <a:extLst>
+              <a:ext uri="{FF2B5EF4-FFF2-40B4-BE49-F238E27FC236}">
+                <a16:creationId xmlns:a16="http://schemas.microsoft.com/office/drawing/2014/main" id="{1C0F531D-2E5A-48E6-A011-E7FCDA2FD82A}"/>
+              </a:ext>
+            </a:extLst>
+          </p:cNvPr>
+          <p:cNvSpPr>
+            <a:spLocks noGrp="1"/>
+          </p:cNvSpPr>
+          <p:nvPr>
+            <p:ph type="ctrTitle"/>
+          </p:nvPr>
+        </p:nvSpPr>
+        <p:spPr>
+          <a:xfrm>
+            <a:off x="1202724" y="1380068"/>
+            <a:ext cx="10300299" cy="2616199"/>
+          </a:xfrm>
+        </p:spPr>
+        <p:txBody>
+          <a:bodyPr/>
+          <a:lstStyle/>
+          <a:p>
+            <a:pPr algn="ctr"/>
+            <a:r>
+              <a:rPr lang="en-US" dirty="0"/>
+              <a:t>Results</a:t>
+            </a:r>
+          </a:p>
+        </p:txBody>
+      </p:sp>
+      <p:sp>
+        <p:nvSpPr>
+          <p:cNvPr id="3" name="Subtitle 2">
+            <a:extLst>
+              <a:ext uri="{FF2B5EF4-FFF2-40B4-BE49-F238E27FC236}">
+                <a16:creationId xmlns:a16="http://schemas.microsoft.com/office/drawing/2014/main" id="{4AB2CF1C-400D-4F1D-85F6-FC716B53C2B2}"/>
+              </a:ext>
+            </a:extLst>
+          </p:cNvPr>
+          <p:cNvSpPr>
+            <a:spLocks noGrp="1"/>
+          </p:cNvSpPr>
+          <p:nvPr>
+            <p:ph type="subTitle" idx="1"/>
+          </p:nvPr>
+        </p:nvSpPr>
+        <p:spPr/>
+        <p:txBody>
+          <a:bodyPr/>
+          <a:lstStyle/>
+          <a:p>
+            <a:endParaRPr lang="en-US"/>
+          </a:p>
+        </p:txBody>
+      </p:sp>
+    </p:spTree>
+    <p:extLst>
+      <p:ext uri="{BB962C8B-B14F-4D97-AF65-F5344CB8AC3E}">
+        <p14:creationId xmlns:p14="http://schemas.microsoft.com/office/powerpoint/2010/main" val="2432444303"/>
+      </p:ext>
+    </p:extLst>
+  </p:cSld>
+  <p:clrMapOvr>
+    <a:masterClrMapping/>
+  </p:clrMapOvr>
+</p:sld>
+</file>
+
+<file path=ppt/slides/slide11.xml><?xml version="1.0" encoding="utf-8"?>
+<p:sld xmlns:a="http://schemas.openxmlformats.org/drawingml/2006/main" xmlns:r="http://schemas.openxmlformats.org/officeDocument/2006/relationships" xmlns:p="http://schemas.openxmlformats.org/presentationml/2006/main">
+  <p:cSld>
+    <p:spTree>
+      <p:nvGrpSpPr>
+        <p:cNvPr id="1" name=""/>
+        <p:cNvGrpSpPr/>
+        <p:nvPr/>
+      </p:nvGrpSpPr>
+      <p:grpSpPr>
+        <a:xfrm>
+          <a:off x="0" y="0"/>
+          <a:ext cx="0" cy="0"/>
+          <a:chOff x="0" y="0"/>
+          <a:chExt cx="0" cy="0"/>
+        </a:xfrm>
+      </p:grpSpPr>
+      <p:sp>
+        <p:nvSpPr>
+          <p:cNvPr id="2" name="Title 1">
+            <a:extLst>
+              <a:ext uri="{FF2B5EF4-FFF2-40B4-BE49-F238E27FC236}">
+                <a16:creationId xmlns:a16="http://schemas.microsoft.com/office/drawing/2014/main" id="{59FC0C5C-6773-4A21-B325-21606F5EBD9F}"/>
+              </a:ext>
+            </a:extLst>
+          </p:cNvPr>
+          <p:cNvSpPr>
+            <a:spLocks noGrp="1"/>
+          </p:cNvSpPr>
+          <p:nvPr>
+            <p:ph type="title"/>
+          </p:nvPr>
+        </p:nvSpPr>
+        <p:spPr/>
+        <p:txBody>
+          <a:bodyPr/>
+          <a:lstStyle/>
+          <a:p>
+            <a:r>
+              <a:rPr lang="en-US" dirty="0"/>
+              <a:t>Performance Analysis</a:t>
+            </a:r>
+          </a:p>
+        </p:txBody>
+      </p:sp>
+      <p:sp>
+        <p:nvSpPr>
+          <p:cNvPr id="3" name="Content Placeholder 2">
+            <a:extLst>
+              <a:ext uri="{FF2B5EF4-FFF2-40B4-BE49-F238E27FC236}">
+                <a16:creationId xmlns:a16="http://schemas.microsoft.com/office/drawing/2014/main" id="{E57F37F3-D1D4-455E-A09C-6A93D01DB2FF}"/>
+              </a:ext>
+            </a:extLst>
+          </p:cNvPr>
+          <p:cNvSpPr>
+            <a:spLocks noGrp="1"/>
+          </p:cNvSpPr>
+          <p:nvPr>
+            <p:ph idx="1"/>
+          </p:nvPr>
+        </p:nvSpPr>
+        <p:spPr/>
+        <p:txBody>
+          <a:bodyPr/>
+          <a:lstStyle/>
+          <a:p>
+            <a:endParaRPr lang="en-US"/>
+          </a:p>
+        </p:txBody>
+      </p:sp>
+    </p:spTree>
+    <p:extLst>
+      <p:ext uri="{BB962C8B-B14F-4D97-AF65-F5344CB8AC3E}">
+        <p14:creationId xmlns:p14="http://schemas.microsoft.com/office/powerpoint/2010/main" val="3807409407"/>
+      </p:ext>
+    </p:extLst>
+  </p:cSld>
+  <p:clrMapOvr>
+    <a:masterClrMapping/>
+  </p:clrMapOvr>
+</p:sld>
+</file>
+
+<file path=ppt/slides/slide12.xml><?xml version="1.0" encoding="utf-8"?>
+<p:sld xmlns:a="http://schemas.openxmlformats.org/drawingml/2006/main" xmlns:r="http://schemas.openxmlformats.org/officeDocument/2006/relationships" xmlns:p="http://schemas.openxmlformats.org/presentationml/2006/main">
+  <p:cSld>
+    <p:spTree>
+      <p:nvGrpSpPr>
+        <p:cNvPr id="1" name=""/>
+        <p:cNvGrpSpPr/>
+        <p:nvPr/>
+      </p:nvGrpSpPr>
+      <p:grpSpPr>
+        <a:xfrm>
+          <a:off x="0" y="0"/>
+          <a:ext cx="0" cy="0"/>
+          <a:chOff x="0" y="0"/>
+          <a:chExt cx="0" cy="0"/>
+        </a:xfrm>
+      </p:grpSpPr>
+      <p:sp>
+        <p:nvSpPr>
+          <p:cNvPr id="2" name="Title 1">
+            <a:extLst>
+              <a:ext uri="{FF2B5EF4-FFF2-40B4-BE49-F238E27FC236}">
+                <a16:creationId xmlns:a16="http://schemas.microsoft.com/office/drawing/2014/main" id="{1C0F531D-2E5A-48E6-A011-E7FCDA2FD82A}"/>
+              </a:ext>
+            </a:extLst>
+          </p:cNvPr>
+          <p:cNvSpPr>
+            <a:spLocks noGrp="1"/>
+          </p:cNvSpPr>
+          <p:nvPr>
+            <p:ph type="ctrTitle"/>
+          </p:nvPr>
+        </p:nvSpPr>
+        <p:spPr>
+          <a:xfrm>
+            <a:off x="1202724" y="1380068"/>
+            <a:ext cx="10300299" cy="2616199"/>
+          </a:xfrm>
+        </p:spPr>
+        <p:txBody>
+          <a:bodyPr/>
+          <a:lstStyle/>
+          <a:p>
+            <a:pPr algn="ctr"/>
+            <a:r>
+              <a:rPr lang="en-US" dirty="0"/>
+              <a:t>Discussion</a:t>
+            </a:r>
+          </a:p>
+        </p:txBody>
+      </p:sp>
+      <p:sp>
+        <p:nvSpPr>
+          <p:cNvPr id="3" name="Subtitle 2">
+            <a:extLst>
+              <a:ext uri="{FF2B5EF4-FFF2-40B4-BE49-F238E27FC236}">
+                <a16:creationId xmlns:a16="http://schemas.microsoft.com/office/drawing/2014/main" id="{4AB2CF1C-400D-4F1D-85F6-FC716B53C2B2}"/>
+              </a:ext>
+            </a:extLst>
+          </p:cNvPr>
+          <p:cNvSpPr>
+            <a:spLocks noGrp="1"/>
+          </p:cNvSpPr>
+          <p:nvPr>
+            <p:ph type="subTitle" idx="1"/>
+          </p:nvPr>
+        </p:nvSpPr>
+        <p:spPr/>
+        <p:txBody>
+          <a:bodyPr/>
+          <a:lstStyle/>
+          <a:p>
+            <a:endParaRPr lang="en-US"/>
+          </a:p>
+        </p:txBody>
+      </p:sp>
+    </p:spTree>
+    <p:extLst>
+      <p:ext uri="{BB962C8B-B14F-4D97-AF65-F5344CB8AC3E}">
+        <p14:creationId xmlns:p14="http://schemas.microsoft.com/office/powerpoint/2010/main" val="1860840868"/>
+      </p:ext>
+    </p:extLst>
+  </p:cSld>
+  <p:clrMapOvr>
+    <a:masterClrMapping/>
+  </p:clrMapOvr>
+</p:sld>
+</file>
+
+<file path=ppt/slides/slide13.xml><?xml version="1.0" encoding="utf-8"?>
+<p:sld xmlns:a="http://schemas.openxmlformats.org/drawingml/2006/main" xmlns:r="http://schemas.openxmlformats.org/officeDocument/2006/relationships" xmlns:p="http://schemas.openxmlformats.org/presentationml/2006/main">
+  <p:cSld>
+    <p:spTree>
+      <p:nvGrpSpPr>
+        <p:cNvPr id="1" name=""/>
+        <p:cNvGrpSpPr/>
+        <p:nvPr/>
+      </p:nvGrpSpPr>
+      <p:grpSpPr>
+        <a:xfrm>
+          <a:off x="0" y="0"/>
+          <a:ext cx="0" cy="0"/>
+          <a:chOff x="0" y="0"/>
+          <a:chExt cx="0" cy="0"/>
+        </a:xfrm>
+      </p:grpSpPr>
+      <p:sp>
+        <p:nvSpPr>
+          <p:cNvPr id="2" name="Title 1">
+            <a:extLst>
+              <a:ext uri="{FF2B5EF4-FFF2-40B4-BE49-F238E27FC236}">
+                <a16:creationId xmlns:a16="http://schemas.microsoft.com/office/drawing/2014/main" id="{8580EFEF-5D64-41E2-BF19-44D99FD56027}"/>
+              </a:ext>
+            </a:extLst>
+          </p:cNvPr>
+          <p:cNvSpPr>
+            <a:spLocks noGrp="1"/>
+          </p:cNvSpPr>
+          <p:nvPr>
+            <p:ph type="title"/>
+          </p:nvPr>
+        </p:nvSpPr>
+        <p:spPr/>
+        <p:txBody>
+          <a:bodyPr/>
+          <a:lstStyle/>
+          <a:p>
+            <a:r>
+              <a:rPr lang="en-US" dirty="0"/>
+              <a:t>Efficiency Evaluation</a:t>
+            </a:r>
+          </a:p>
+        </p:txBody>
+      </p:sp>
+      <p:sp>
+        <p:nvSpPr>
+          <p:cNvPr id="3" name="Content Placeholder 2">
+            <a:extLst>
+              <a:ext uri="{FF2B5EF4-FFF2-40B4-BE49-F238E27FC236}">
+                <a16:creationId xmlns:a16="http://schemas.microsoft.com/office/drawing/2014/main" id="{7563D280-FB6D-41D0-A29D-EFBD6657F5F6}"/>
+              </a:ext>
+            </a:extLst>
+          </p:cNvPr>
+          <p:cNvSpPr>
+            <a:spLocks noGrp="1"/>
+          </p:cNvSpPr>
+          <p:nvPr>
+            <p:ph idx="1"/>
+          </p:nvPr>
+        </p:nvSpPr>
+        <p:spPr/>
+        <p:txBody>
+          <a:bodyPr/>
+          <a:lstStyle/>
+          <a:p>
+            <a:endParaRPr lang="en-US"/>
+          </a:p>
+        </p:txBody>
+      </p:sp>
+    </p:spTree>
+    <p:extLst>
+      <p:ext uri="{BB962C8B-B14F-4D97-AF65-F5344CB8AC3E}">
+        <p14:creationId xmlns:p14="http://schemas.microsoft.com/office/powerpoint/2010/main" val="3117972331"/>
+      </p:ext>
+    </p:extLst>
+  </p:cSld>
+  <p:clrMapOvr>
+    <a:masterClrMapping/>
+  </p:clrMapOvr>
+</p:sld>
+</file>
+
+<file path=ppt/slides/slide14.xml><?xml version="1.0" encoding="utf-8"?>
+<p:sld xmlns:a="http://schemas.openxmlformats.org/drawingml/2006/main" xmlns:r="http://schemas.openxmlformats.org/officeDocument/2006/relationships" xmlns:p="http://schemas.openxmlformats.org/presentationml/2006/main">
+  <p:cSld>
+    <p:spTree>
+      <p:nvGrpSpPr>
+        <p:cNvPr id="1" name=""/>
+        <p:cNvGrpSpPr/>
+        <p:nvPr/>
+      </p:nvGrpSpPr>
+      <p:grpSpPr>
+        <a:xfrm>
+          <a:off x="0" y="0"/>
+          <a:ext cx="0" cy="0"/>
+          <a:chOff x="0" y="0"/>
+          <a:chExt cx="0" cy="0"/>
+        </a:xfrm>
+      </p:grpSpPr>
+      <p:sp>
+        <p:nvSpPr>
+          <p:cNvPr id="2" name="Title 1">
+            <a:extLst>
+              <a:ext uri="{FF2B5EF4-FFF2-40B4-BE49-F238E27FC236}">
+                <a16:creationId xmlns:a16="http://schemas.microsoft.com/office/drawing/2014/main" id="{8446B410-A85F-4DF3-8D95-503619D583DC}"/>
+              </a:ext>
+            </a:extLst>
+          </p:cNvPr>
+          <p:cNvSpPr>
+            <a:spLocks noGrp="1"/>
+          </p:cNvSpPr>
+          <p:nvPr>
+            <p:ph type="title"/>
+          </p:nvPr>
+        </p:nvSpPr>
+        <p:spPr/>
+        <p:txBody>
+          <a:bodyPr/>
+          <a:lstStyle/>
+          <a:p>
+            <a:r>
+              <a:rPr lang="en-US" dirty="0"/>
+              <a:t>Limitations</a:t>
+            </a:r>
+          </a:p>
+        </p:txBody>
+      </p:sp>
+      <p:sp>
+        <p:nvSpPr>
+          <p:cNvPr id="3" name="Content Placeholder 2">
+            <a:extLst>
+              <a:ext uri="{FF2B5EF4-FFF2-40B4-BE49-F238E27FC236}">
+                <a16:creationId xmlns:a16="http://schemas.microsoft.com/office/drawing/2014/main" id="{22C49BB7-1795-4622-99D1-2F95ACCF6F73}"/>
+              </a:ext>
+            </a:extLst>
+          </p:cNvPr>
+          <p:cNvSpPr>
+            <a:spLocks noGrp="1"/>
+          </p:cNvSpPr>
+          <p:nvPr>
+            <p:ph idx="1"/>
+          </p:nvPr>
+        </p:nvSpPr>
+        <p:spPr/>
+        <p:txBody>
+          <a:bodyPr/>
+          <a:lstStyle/>
+          <a:p>
+            <a:endParaRPr lang="en-US"/>
+          </a:p>
+        </p:txBody>
+      </p:sp>
+    </p:spTree>
+    <p:extLst>
+      <p:ext uri="{BB962C8B-B14F-4D97-AF65-F5344CB8AC3E}">
+        <p14:creationId xmlns:p14="http://schemas.microsoft.com/office/powerpoint/2010/main" val="119602023"/>
+      </p:ext>
+    </p:extLst>
+  </p:cSld>
+  <p:clrMapOvr>
+    <a:masterClrMapping/>
+  </p:clrMapOvr>
+</p:sld>
+</file>
+
+<file path=ppt/slides/slide15.xml><?xml version="1.0" encoding="utf-8"?>
+<p:sld xmlns:a="http://schemas.openxmlformats.org/drawingml/2006/main" xmlns:r="http://schemas.openxmlformats.org/officeDocument/2006/relationships" xmlns:p="http://schemas.openxmlformats.org/presentationml/2006/main">
+  <p:cSld>
+    <p:spTree>
+      <p:nvGrpSpPr>
+        <p:cNvPr id="1" name=""/>
+        <p:cNvGrpSpPr/>
+        <p:nvPr/>
+      </p:nvGrpSpPr>
+      <p:grpSpPr>
+        <a:xfrm>
+          <a:off x="0" y="0"/>
+          <a:ext cx="0" cy="0"/>
+          <a:chOff x="0" y="0"/>
+          <a:chExt cx="0" cy="0"/>
+        </a:xfrm>
+      </p:grpSpPr>
+      <p:sp>
+        <p:nvSpPr>
+          <p:cNvPr id="2" name="Title 1">
+            <a:extLst>
+              <a:ext uri="{FF2B5EF4-FFF2-40B4-BE49-F238E27FC236}">
+                <a16:creationId xmlns:a16="http://schemas.microsoft.com/office/drawing/2014/main" id="{1C0F531D-2E5A-48E6-A011-E7FCDA2FD82A}"/>
+              </a:ext>
+            </a:extLst>
+          </p:cNvPr>
+          <p:cNvSpPr>
+            <a:spLocks noGrp="1"/>
+          </p:cNvSpPr>
+          <p:nvPr>
+            <p:ph type="ctrTitle"/>
+          </p:nvPr>
+        </p:nvSpPr>
+        <p:spPr>
+          <a:xfrm>
+            <a:off x="1202724" y="1380068"/>
+            <a:ext cx="10300299" cy="2616199"/>
+          </a:xfrm>
+        </p:spPr>
+        <p:txBody>
+          <a:bodyPr/>
+          <a:lstStyle/>
+          <a:p>
+            <a:pPr algn="ctr"/>
+            <a:r>
+              <a:rPr lang="en-US" dirty="0"/>
+              <a:t>Conclusion</a:t>
+            </a:r>
+          </a:p>
+        </p:txBody>
+      </p:sp>
+      <p:sp>
+        <p:nvSpPr>
+          <p:cNvPr id="3" name="Subtitle 2">
+            <a:extLst>
+              <a:ext uri="{FF2B5EF4-FFF2-40B4-BE49-F238E27FC236}">
+                <a16:creationId xmlns:a16="http://schemas.microsoft.com/office/drawing/2014/main" id="{4AB2CF1C-400D-4F1D-85F6-FC716B53C2B2}"/>
+              </a:ext>
+            </a:extLst>
+          </p:cNvPr>
+          <p:cNvSpPr>
+            <a:spLocks noGrp="1"/>
+          </p:cNvSpPr>
+          <p:nvPr>
+            <p:ph type="subTitle" idx="1"/>
+          </p:nvPr>
+        </p:nvSpPr>
+        <p:spPr/>
+        <p:txBody>
+          <a:bodyPr/>
+          <a:lstStyle/>
+          <a:p>
+            <a:endParaRPr lang="en-US"/>
+          </a:p>
+        </p:txBody>
+      </p:sp>
+    </p:spTree>
+    <p:extLst>
+      <p:ext uri="{BB962C8B-B14F-4D97-AF65-F5344CB8AC3E}">
+        <p14:creationId xmlns:p14="http://schemas.microsoft.com/office/powerpoint/2010/main" val="869638968"/>
+      </p:ext>
+    </p:extLst>
+  </p:cSld>
+  <p:clrMapOvr>
+    <a:masterClrMapping/>
+  </p:clrMapOvr>
+</p:sld>
+</file>
+
+<file path=ppt/slides/slide16.xml><?xml version="1.0" encoding="utf-8"?>
+<p:sld xmlns:a="http://schemas.openxmlformats.org/drawingml/2006/main" xmlns:r="http://schemas.openxmlformats.org/officeDocument/2006/relationships" xmlns:p="http://schemas.openxmlformats.org/presentationml/2006/main">
+  <p:cSld>
+    <p:spTree>
+      <p:nvGrpSpPr>
+        <p:cNvPr id="1" name=""/>
+        <p:cNvGrpSpPr/>
+        <p:nvPr/>
+      </p:nvGrpSpPr>
+      <p:grpSpPr>
+        <a:xfrm>
+          <a:off x="0" y="0"/>
+          <a:ext cx="0" cy="0"/>
+          <a:chOff x="0" y="0"/>
+          <a:chExt cx="0" cy="0"/>
+        </a:xfrm>
+      </p:grpSpPr>
+      <p:sp>
+        <p:nvSpPr>
+          <p:cNvPr id="2" name="Title 1">
+            <a:extLst>
+              <a:ext uri="{FF2B5EF4-FFF2-40B4-BE49-F238E27FC236}">
+                <a16:creationId xmlns:a16="http://schemas.microsoft.com/office/drawing/2014/main" id="{B5854972-B376-4E58-A2A1-A73024262163}"/>
+              </a:ext>
+            </a:extLst>
+          </p:cNvPr>
+          <p:cNvSpPr>
+            <a:spLocks noGrp="1"/>
+          </p:cNvSpPr>
+          <p:nvPr>
+            <p:ph type="title"/>
+          </p:nvPr>
+        </p:nvSpPr>
+        <p:spPr/>
+        <p:txBody>
+          <a:bodyPr/>
+          <a:lstStyle/>
+          <a:p>
+            <a:r>
+              <a:rPr lang="en-US" dirty="0"/>
+              <a:t>Summary of Findings</a:t>
+            </a:r>
+          </a:p>
+        </p:txBody>
+      </p:sp>
+      <p:sp>
+        <p:nvSpPr>
+          <p:cNvPr id="3" name="Content Placeholder 2">
+            <a:extLst>
+              <a:ext uri="{FF2B5EF4-FFF2-40B4-BE49-F238E27FC236}">
+                <a16:creationId xmlns:a16="http://schemas.microsoft.com/office/drawing/2014/main" id="{C6CBC30A-7494-45A4-8CFA-B2940D92BFFA}"/>
+              </a:ext>
+            </a:extLst>
+          </p:cNvPr>
+          <p:cNvSpPr>
+            <a:spLocks noGrp="1"/>
+          </p:cNvSpPr>
+          <p:nvPr>
+            <p:ph idx="1"/>
+          </p:nvPr>
+        </p:nvSpPr>
+        <p:spPr/>
+        <p:txBody>
+          <a:bodyPr/>
+          <a:lstStyle/>
+          <a:p>
+            <a:endParaRPr lang="en-US"/>
+          </a:p>
+        </p:txBody>
+      </p:sp>
+    </p:spTree>
+    <p:extLst>
+      <p:ext uri="{BB962C8B-B14F-4D97-AF65-F5344CB8AC3E}">
+        <p14:creationId xmlns:p14="http://schemas.microsoft.com/office/powerpoint/2010/main" val="937337035"/>
+      </p:ext>
+    </p:extLst>
+  </p:cSld>
+  <p:clrMapOvr>
+    <a:masterClrMapping/>
+  </p:clrMapOvr>
+</p:sld>
+</file>
+
+<file path=ppt/slides/slide17.xml><?xml version="1.0" encoding="utf-8"?>
+<p:sld xmlns:a="http://schemas.openxmlformats.org/drawingml/2006/main" xmlns:r="http://schemas.openxmlformats.org/officeDocument/2006/relationships" xmlns:p="http://schemas.openxmlformats.org/presentationml/2006/main">
+  <p:cSld>
+    <p:spTree>
+      <p:nvGrpSpPr>
+        <p:cNvPr id="1" name=""/>
+        <p:cNvGrpSpPr/>
+        <p:nvPr/>
+      </p:nvGrpSpPr>
+      <p:grpSpPr>
+        <a:xfrm>
+          <a:off x="0" y="0"/>
+          <a:ext cx="0" cy="0"/>
+          <a:chOff x="0" y="0"/>
+          <a:chExt cx="0" cy="0"/>
+        </a:xfrm>
+      </p:grpSpPr>
+      <p:sp>
+        <p:nvSpPr>
+          <p:cNvPr id="2" name="Title 1">
+            <a:extLst>
+              <a:ext uri="{FF2B5EF4-FFF2-40B4-BE49-F238E27FC236}">
+                <a16:creationId xmlns:a16="http://schemas.microsoft.com/office/drawing/2014/main" id="{F3AF062E-AC73-4B71-A6FE-033D6827A1FB}"/>
+              </a:ext>
+            </a:extLst>
+          </p:cNvPr>
+          <p:cNvSpPr>
+            <a:spLocks noGrp="1"/>
+          </p:cNvSpPr>
+          <p:nvPr>
+            <p:ph type="title"/>
+          </p:nvPr>
+        </p:nvSpPr>
+        <p:spPr/>
+        <p:txBody>
+          <a:bodyPr/>
+          <a:lstStyle/>
+          <a:p>
+            <a:r>
+              <a:rPr lang="en-US" dirty="0"/>
+              <a:t>Recommendations</a:t>
+            </a:r>
+          </a:p>
+        </p:txBody>
+      </p:sp>
+      <p:sp>
+        <p:nvSpPr>
+          <p:cNvPr id="3" name="Content Placeholder 2">
+            <a:extLst>
+              <a:ext uri="{FF2B5EF4-FFF2-40B4-BE49-F238E27FC236}">
+                <a16:creationId xmlns:a16="http://schemas.microsoft.com/office/drawing/2014/main" id="{51C5F585-BA3E-420E-BD7E-708E0F4504FF}"/>
+              </a:ext>
+            </a:extLst>
+          </p:cNvPr>
+          <p:cNvSpPr>
+            <a:spLocks noGrp="1"/>
+          </p:cNvSpPr>
+          <p:nvPr>
+            <p:ph idx="1"/>
+          </p:nvPr>
+        </p:nvSpPr>
+        <p:spPr/>
+        <p:txBody>
+          <a:bodyPr/>
+          <a:lstStyle/>
+          <a:p>
+            <a:endParaRPr lang="en-US"/>
+          </a:p>
+        </p:txBody>
+      </p:sp>
+    </p:spTree>
+    <p:extLst>
+      <p:ext uri="{BB962C8B-B14F-4D97-AF65-F5344CB8AC3E}">
+        <p14:creationId xmlns:p14="http://schemas.microsoft.com/office/powerpoint/2010/main" val="4260718036"/>
+      </p:ext>
+    </p:extLst>
+  </p:cSld>
+  <p:clrMapOvr>
+    <a:masterClrMapping/>
+  </p:clrMapOvr>
+</p:sld>
+</file>
+
+<file path=ppt/slides/slide18.xml><?xml version="1.0" encoding="utf-8"?>
+<p:sld xmlns:a="http://schemas.openxmlformats.org/drawingml/2006/main" xmlns:r="http://schemas.openxmlformats.org/officeDocument/2006/relationships" xmlns:p="http://schemas.openxmlformats.org/presentationml/2006/main">
+  <p:cSld>
+    <p:spTree>
+      <p:nvGrpSpPr>
+        <p:cNvPr id="1" name=""/>
+        <p:cNvGrpSpPr/>
+        <p:nvPr/>
+      </p:nvGrpSpPr>
+      <p:grpSpPr>
+        <a:xfrm>
+          <a:off x="0" y="0"/>
+          <a:ext cx="0" cy="0"/>
+          <a:chOff x="0" y="0"/>
+          <a:chExt cx="0" cy="0"/>
+        </a:xfrm>
+      </p:grpSpPr>
+      <p:sp>
+        <p:nvSpPr>
+          <p:cNvPr id="2" name="Title 1">
+            <a:extLst>
+              <a:ext uri="{FF2B5EF4-FFF2-40B4-BE49-F238E27FC236}">
+                <a16:creationId xmlns:a16="http://schemas.microsoft.com/office/drawing/2014/main" id="{C56E3F6A-918E-4907-BC69-553943D769C4}"/>
+              </a:ext>
+            </a:extLst>
+          </p:cNvPr>
+          <p:cNvSpPr>
+            <a:spLocks noGrp="1"/>
+          </p:cNvSpPr>
+          <p:nvPr>
+            <p:ph type="title"/>
+          </p:nvPr>
+        </p:nvSpPr>
+        <p:spPr/>
+        <p:txBody>
+          <a:bodyPr/>
+          <a:lstStyle/>
+          <a:p>
+            <a:r>
+              <a:rPr lang="en-US" dirty="0"/>
+              <a:t>References</a:t>
+            </a:r>
+          </a:p>
+        </p:txBody>
+      </p:sp>
+      <p:sp>
+        <p:nvSpPr>
+          <p:cNvPr id="3" name="Content Placeholder 2">
+            <a:extLst>
+              <a:ext uri="{FF2B5EF4-FFF2-40B4-BE49-F238E27FC236}">
+                <a16:creationId xmlns:a16="http://schemas.microsoft.com/office/drawing/2014/main" id="{CF006629-3517-4CCC-BBF7-5FF166843E99}"/>
+              </a:ext>
+            </a:extLst>
+          </p:cNvPr>
+          <p:cNvSpPr>
+            <a:spLocks noGrp="1"/>
+          </p:cNvSpPr>
+          <p:nvPr>
+            <p:ph idx="1"/>
+          </p:nvPr>
+        </p:nvSpPr>
+        <p:spPr/>
+        <p:txBody>
+          <a:bodyPr/>
+          <a:lstStyle/>
+          <a:p>
+            <a:endParaRPr lang="en-US"/>
+          </a:p>
+        </p:txBody>
+      </p:sp>
+    </p:spTree>
+    <p:extLst>
+      <p:ext uri="{BB962C8B-B14F-4D97-AF65-F5344CB8AC3E}">
+        <p14:creationId xmlns:p14="http://schemas.microsoft.com/office/powerpoint/2010/main" val="3683937927"/>
+      </p:ext>
+    </p:extLst>
+  </p:cSld>
+  <p:clrMapOvr>
+    <a:masterClrMapping/>
+  </p:clrMapOvr>
+</p:sld>
+</file>
+
+<file path=ppt/slides/slide19.xml><?xml version="1.0" encoding="utf-8"?>
+<p:sld xmlns:a="http://schemas.openxmlformats.org/drawingml/2006/main" xmlns:r="http://schemas.openxmlformats.org/officeDocument/2006/relationships" xmlns:p="http://schemas.openxmlformats.org/presentationml/2006/main">
+  <p:cSld>
+    <p:spTree>
+      <p:nvGrpSpPr>
+        <p:cNvPr id="1" name=""/>
+        <p:cNvGrpSpPr/>
+        <p:nvPr/>
+      </p:nvGrpSpPr>
+      <p:grpSpPr>
+        <a:xfrm>
+          <a:off x="0" y="0"/>
+          <a:ext cx="0" cy="0"/>
+          <a:chOff x="0" y="0"/>
+          <a:chExt cx="0" cy="0"/>
+        </a:xfrm>
+      </p:grpSpPr>
+      <p:sp>
+        <p:nvSpPr>
+          <p:cNvPr id="2" name="Title 1">
+            <a:extLst>
+              <a:ext uri="{FF2B5EF4-FFF2-40B4-BE49-F238E27FC236}">
+                <a16:creationId xmlns:a16="http://schemas.microsoft.com/office/drawing/2014/main" id="{A56A4ECD-61C0-43D1-A5D5-057092A67D8F}"/>
+              </a:ext>
+            </a:extLst>
+          </p:cNvPr>
+          <p:cNvSpPr>
+            <a:spLocks noGrp="1"/>
+          </p:cNvSpPr>
+          <p:nvPr>
+            <p:ph type="title"/>
+          </p:nvPr>
+        </p:nvSpPr>
+        <p:spPr/>
+        <p:txBody>
+          <a:bodyPr/>
+          <a:lstStyle/>
+          <a:p>
+            <a:r>
+              <a:rPr lang="en-US" dirty="0"/>
+              <a:t>Additional Material</a:t>
+            </a:r>
+          </a:p>
+        </p:txBody>
+      </p:sp>
+      <p:sp>
+        <p:nvSpPr>
+          <p:cNvPr id="3" name="Content Placeholder 2">
+            <a:extLst>
+              <a:ext uri="{FF2B5EF4-FFF2-40B4-BE49-F238E27FC236}">
+                <a16:creationId xmlns:a16="http://schemas.microsoft.com/office/drawing/2014/main" id="{B50A0168-9955-47F6-B476-F0CB2AA41A6B}"/>
+              </a:ext>
+            </a:extLst>
+          </p:cNvPr>
+          <p:cNvSpPr>
+            <a:spLocks noGrp="1"/>
+          </p:cNvSpPr>
+          <p:nvPr>
+            <p:ph idx="1"/>
+          </p:nvPr>
+        </p:nvSpPr>
+        <p:spPr/>
+        <p:txBody>
+          <a:bodyPr/>
+          <a:lstStyle/>
+          <a:p>
+            <a:endParaRPr lang="en-US"/>
+          </a:p>
+        </p:txBody>
+      </p:sp>
+    </p:spTree>
+    <p:extLst>
+      <p:ext uri="{BB962C8B-B14F-4D97-AF65-F5344CB8AC3E}">
+        <p14:creationId xmlns:p14="http://schemas.microsoft.com/office/powerpoint/2010/main" val="30362363"/>
+      </p:ext>
+    </p:extLst>
+  </p:cSld>
+  <p:clrMapOvr>
+    <a:masterClrMapping/>
+  </p:clrMapOvr>
+</p:sld>
+</file>
+
 <file path=ppt/slides/slide2.xml><?xml version="1.0" encoding="utf-8"?>
 <p:sld xmlns:a="http://schemas.openxmlformats.org/drawingml/2006/main" xmlns:r="http://schemas.openxmlformats.org/officeDocument/2006/relationships" xmlns:p="http://schemas.openxmlformats.org/presentationml/2006/main">
   <p:cSld>
@@ -6291,6 +7161,599 @@
     <p:extLst>
       <p:ext uri="{BB962C8B-B14F-4D97-AF65-F5344CB8AC3E}">
         <p14:creationId xmlns:p14="http://schemas.microsoft.com/office/powerpoint/2010/main" val="647247443"/>
+      </p:ext>
+    </p:extLst>
+  </p:cSld>
+  <p:clrMapOvr>
+    <a:masterClrMapping/>
+  </p:clrMapOvr>
+</p:sld>
+</file>
+
+<file path=ppt/slides/slide3.xml><?xml version="1.0" encoding="utf-8"?>
+<p:sld xmlns:a="http://schemas.openxmlformats.org/drawingml/2006/main" xmlns:r="http://schemas.openxmlformats.org/officeDocument/2006/relationships" xmlns:p="http://schemas.openxmlformats.org/presentationml/2006/main">
+  <p:cSld>
+    <p:spTree>
+      <p:nvGrpSpPr>
+        <p:cNvPr id="1" name=""/>
+        <p:cNvGrpSpPr/>
+        <p:nvPr/>
+      </p:nvGrpSpPr>
+      <p:grpSpPr>
+        <a:xfrm>
+          <a:off x="0" y="0"/>
+          <a:ext cx="0" cy="0"/>
+          <a:chOff x="0" y="0"/>
+          <a:chExt cx="0" cy="0"/>
+        </a:xfrm>
+      </p:grpSpPr>
+      <p:sp>
+        <p:nvSpPr>
+          <p:cNvPr id="2" name="Title 1">
+            <a:extLst>
+              <a:ext uri="{FF2B5EF4-FFF2-40B4-BE49-F238E27FC236}">
+                <a16:creationId xmlns:a16="http://schemas.microsoft.com/office/drawing/2014/main" id="{1C0F531D-2E5A-48E6-A011-E7FCDA2FD82A}"/>
+              </a:ext>
+            </a:extLst>
+          </p:cNvPr>
+          <p:cNvSpPr>
+            <a:spLocks noGrp="1"/>
+          </p:cNvSpPr>
+          <p:nvPr>
+            <p:ph type="ctrTitle"/>
+          </p:nvPr>
+        </p:nvSpPr>
+        <p:spPr>
+          <a:xfrm>
+            <a:off x="1202724" y="1380068"/>
+            <a:ext cx="10300299" cy="2616199"/>
+          </a:xfrm>
+        </p:spPr>
+        <p:txBody>
+          <a:bodyPr/>
+          <a:lstStyle/>
+          <a:p>
+            <a:pPr algn="ctr"/>
+            <a:r>
+              <a:rPr lang="en-US" dirty="0"/>
+              <a:t>Introduction</a:t>
+            </a:r>
+          </a:p>
+        </p:txBody>
+      </p:sp>
+      <p:sp>
+        <p:nvSpPr>
+          <p:cNvPr id="3" name="Subtitle 2">
+            <a:extLst>
+              <a:ext uri="{FF2B5EF4-FFF2-40B4-BE49-F238E27FC236}">
+                <a16:creationId xmlns:a16="http://schemas.microsoft.com/office/drawing/2014/main" id="{4AB2CF1C-400D-4F1D-85F6-FC716B53C2B2}"/>
+              </a:ext>
+            </a:extLst>
+          </p:cNvPr>
+          <p:cNvSpPr>
+            <a:spLocks noGrp="1"/>
+          </p:cNvSpPr>
+          <p:nvPr>
+            <p:ph type="subTitle" idx="1"/>
+          </p:nvPr>
+        </p:nvSpPr>
+        <p:spPr/>
+        <p:txBody>
+          <a:bodyPr/>
+          <a:lstStyle/>
+          <a:p>
+            <a:endParaRPr lang="en-US"/>
+          </a:p>
+        </p:txBody>
+      </p:sp>
+    </p:spTree>
+    <p:extLst>
+      <p:ext uri="{BB962C8B-B14F-4D97-AF65-F5344CB8AC3E}">
+        <p14:creationId xmlns:p14="http://schemas.microsoft.com/office/powerpoint/2010/main" val="2580783880"/>
+      </p:ext>
+    </p:extLst>
+  </p:cSld>
+  <p:clrMapOvr>
+    <a:masterClrMapping/>
+  </p:clrMapOvr>
+</p:sld>
+</file>
+
+<file path=ppt/slides/slide4.xml><?xml version="1.0" encoding="utf-8"?>
+<p:sld xmlns:a="http://schemas.openxmlformats.org/drawingml/2006/main" xmlns:r="http://schemas.openxmlformats.org/officeDocument/2006/relationships" xmlns:p="http://schemas.openxmlformats.org/presentationml/2006/main">
+  <p:cSld>
+    <p:spTree>
+      <p:nvGrpSpPr>
+        <p:cNvPr id="1" name=""/>
+        <p:cNvGrpSpPr/>
+        <p:nvPr/>
+      </p:nvGrpSpPr>
+      <p:grpSpPr>
+        <a:xfrm>
+          <a:off x="0" y="0"/>
+          <a:ext cx="0" cy="0"/>
+          <a:chOff x="0" y="0"/>
+          <a:chExt cx="0" cy="0"/>
+        </a:xfrm>
+      </p:grpSpPr>
+      <p:sp>
+        <p:nvSpPr>
+          <p:cNvPr id="2" name="Title 1">
+            <a:extLst>
+              <a:ext uri="{FF2B5EF4-FFF2-40B4-BE49-F238E27FC236}">
+                <a16:creationId xmlns:a16="http://schemas.microsoft.com/office/drawing/2014/main" id="{0AF1F32E-563D-4136-A6E1-3356ABD998D6}"/>
+              </a:ext>
+            </a:extLst>
+          </p:cNvPr>
+          <p:cNvSpPr>
+            <a:spLocks noGrp="1"/>
+          </p:cNvSpPr>
+          <p:nvPr>
+            <p:ph type="title"/>
+          </p:nvPr>
+        </p:nvSpPr>
+        <p:spPr/>
+        <p:txBody>
+          <a:bodyPr/>
+          <a:lstStyle/>
+          <a:p>
+            <a:r>
+              <a:rPr lang="en-US" dirty="0"/>
+              <a:t>Background</a:t>
+            </a:r>
+          </a:p>
+        </p:txBody>
+      </p:sp>
+      <p:sp>
+        <p:nvSpPr>
+          <p:cNvPr id="3" name="Content Placeholder 2">
+            <a:extLst>
+              <a:ext uri="{FF2B5EF4-FFF2-40B4-BE49-F238E27FC236}">
+                <a16:creationId xmlns:a16="http://schemas.microsoft.com/office/drawing/2014/main" id="{9F50C49F-C39C-4729-8F0B-22B5EA4C615F}"/>
+              </a:ext>
+            </a:extLst>
+          </p:cNvPr>
+          <p:cNvSpPr>
+            <a:spLocks noGrp="1"/>
+          </p:cNvSpPr>
+          <p:nvPr>
+            <p:ph idx="1"/>
+          </p:nvPr>
+        </p:nvSpPr>
+        <p:spPr/>
+        <p:txBody>
+          <a:bodyPr/>
+          <a:lstStyle/>
+          <a:p>
+            <a:endParaRPr lang="en-US"/>
+          </a:p>
+        </p:txBody>
+      </p:sp>
+    </p:spTree>
+    <p:extLst>
+      <p:ext uri="{BB962C8B-B14F-4D97-AF65-F5344CB8AC3E}">
+        <p14:creationId xmlns:p14="http://schemas.microsoft.com/office/powerpoint/2010/main" val="2859619076"/>
+      </p:ext>
+    </p:extLst>
+  </p:cSld>
+  <p:clrMapOvr>
+    <a:masterClrMapping/>
+  </p:clrMapOvr>
+</p:sld>
+</file>
+
+<file path=ppt/slides/slide5.xml><?xml version="1.0" encoding="utf-8"?>
+<p:sld xmlns:a="http://schemas.openxmlformats.org/drawingml/2006/main" xmlns:r="http://schemas.openxmlformats.org/officeDocument/2006/relationships" xmlns:p="http://schemas.openxmlformats.org/presentationml/2006/main">
+  <p:cSld>
+    <p:spTree>
+      <p:nvGrpSpPr>
+        <p:cNvPr id="1" name=""/>
+        <p:cNvGrpSpPr/>
+        <p:nvPr/>
+      </p:nvGrpSpPr>
+      <p:grpSpPr>
+        <a:xfrm>
+          <a:off x="0" y="0"/>
+          <a:ext cx="0" cy="0"/>
+          <a:chOff x="0" y="0"/>
+          <a:chExt cx="0" cy="0"/>
+        </a:xfrm>
+      </p:grpSpPr>
+      <p:sp>
+        <p:nvSpPr>
+          <p:cNvPr id="2" name="Title 1">
+            <a:extLst>
+              <a:ext uri="{FF2B5EF4-FFF2-40B4-BE49-F238E27FC236}">
+                <a16:creationId xmlns:a16="http://schemas.microsoft.com/office/drawing/2014/main" id="{3EE1822F-965E-4B2F-96A8-F1FADD5D0533}"/>
+              </a:ext>
+            </a:extLst>
+          </p:cNvPr>
+          <p:cNvSpPr>
+            <a:spLocks noGrp="1"/>
+          </p:cNvSpPr>
+          <p:nvPr>
+            <p:ph type="title"/>
+          </p:nvPr>
+        </p:nvSpPr>
+        <p:spPr/>
+        <p:txBody>
+          <a:bodyPr/>
+          <a:lstStyle/>
+          <a:p>
+            <a:r>
+              <a:rPr lang="en-US" dirty="0"/>
+              <a:t>Problem Statement</a:t>
+            </a:r>
+          </a:p>
+        </p:txBody>
+      </p:sp>
+      <p:sp>
+        <p:nvSpPr>
+          <p:cNvPr id="3" name="Content Placeholder 2">
+            <a:extLst>
+              <a:ext uri="{FF2B5EF4-FFF2-40B4-BE49-F238E27FC236}">
+                <a16:creationId xmlns:a16="http://schemas.microsoft.com/office/drawing/2014/main" id="{9E9F9FBF-B6FF-4A2F-9DAA-C89A7449B476}"/>
+              </a:ext>
+            </a:extLst>
+          </p:cNvPr>
+          <p:cNvSpPr>
+            <a:spLocks noGrp="1"/>
+          </p:cNvSpPr>
+          <p:nvPr>
+            <p:ph idx="1"/>
+          </p:nvPr>
+        </p:nvSpPr>
+        <p:spPr/>
+        <p:txBody>
+          <a:bodyPr/>
+          <a:lstStyle/>
+          <a:p>
+            <a:endParaRPr lang="en-US"/>
+          </a:p>
+        </p:txBody>
+      </p:sp>
+    </p:spTree>
+    <p:extLst>
+      <p:ext uri="{BB962C8B-B14F-4D97-AF65-F5344CB8AC3E}">
+        <p14:creationId xmlns:p14="http://schemas.microsoft.com/office/powerpoint/2010/main" val="2910986965"/>
+      </p:ext>
+    </p:extLst>
+  </p:cSld>
+  <p:clrMapOvr>
+    <a:masterClrMapping/>
+  </p:clrMapOvr>
+</p:sld>
+</file>
+
+<file path=ppt/slides/slide6.xml><?xml version="1.0" encoding="utf-8"?>
+<p:sld xmlns:a="http://schemas.openxmlformats.org/drawingml/2006/main" xmlns:r="http://schemas.openxmlformats.org/officeDocument/2006/relationships" xmlns:p="http://schemas.openxmlformats.org/presentationml/2006/main">
+  <p:cSld>
+    <p:spTree>
+      <p:nvGrpSpPr>
+        <p:cNvPr id="1" name=""/>
+        <p:cNvGrpSpPr/>
+        <p:nvPr/>
+      </p:nvGrpSpPr>
+      <p:grpSpPr>
+        <a:xfrm>
+          <a:off x="0" y="0"/>
+          <a:ext cx="0" cy="0"/>
+          <a:chOff x="0" y="0"/>
+          <a:chExt cx="0" cy="0"/>
+        </a:xfrm>
+      </p:grpSpPr>
+      <p:sp>
+        <p:nvSpPr>
+          <p:cNvPr id="2" name="Title 1">
+            <a:extLst>
+              <a:ext uri="{FF2B5EF4-FFF2-40B4-BE49-F238E27FC236}">
+                <a16:creationId xmlns:a16="http://schemas.microsoft.com/office/drawing/2014/main" id="{CAC0FC35-1F29-424A-8E71-4FA717CCDCFE}"/>
+              </a:ext>
+            </a:extLst>
+          </p:cNvPr>
+          <p:cNvSpPr>
+            <a:spLocks noGrp="1"/>
+          </p:cNvSpPr>
+          <p:nvPr>
+            <p:ph type="title"/>
+          </p:nvPr>
+        </p:nvSpPr>
+        <p:spPr/>
+        <p:txBody>
+          <a:bodyPr/>
+          <a:lstStyle/>
+          <a:p>
+            <a:r>
+              <a:rPr lang="en-US" dirty="0"/>
+              <a:t>Objective</a:t>
+            </a:r>
+          </a:p>
+        </p:txBody>
+      </p:sp>
+      <p:sp>
+        <p:nvSpPr>
+          <p:cNvPr id="3" name="Content Placeholder 2">
+            <a:extLst>
+              <a:ext uri="{FF2B5EF4-FFF2-40B4-BE49-F238E27FC236}">
+                <a16:creationId xmlns:a16="http://schemas.microsoft.com/office/drawing/2014/main" id="{FDB25CD6-CBFD-46E0-AC78-798C1C32DBFD}"/>
+              </a:ext>
+            </a:extLst>
+          </p:cNvPr>
+          <p:cNvSpPr>
+            <a:spLocks noGrp="1"/>
+          </p:cNvSpPr>
+          <p:nvPr>
+            <p:ph idx="1"/>
+          </p:nvPr>
+        </p:nvSpPr>
+        <p:spPr/>
+        <p:txBody>
+          <a:bodyPr/>
+          <a:lstStyle/>
+          <a:p>
+            <a:endParaRPr lang="en-US"/>
+          </a:p>
+        </p:txBody>
+      </p:sp>
+    </p:spTree>
+    <p:extLst>
+      <p:ext uri="{BB962C8B-B14F-4D97-AF65-F5344CB8AC3E}">
+        <p14:creationId xmlns:p14="http://schemas.microsoft.com/office/powerpoint/2010/main" val="1522115400"/>
+      </p:ext>
+    </p:extLst>
+  </p:cSld>
+  <p:clrMapOvr>
+    <a:masterClrMapping/>
+  </p:clrMapOvr>
+</p:sld>
+</file>
+
+<file path=ppt/slides/slide7.xml><?xml version="1.0" encoding="utf-8"?>
+<p:sld xmlns:a="http://schemas.openxmlformats.org/drawingml/2006/main" xmlns:r="http://schemas.openxmlformats.org/officeDocument/2006/relationships" xmlns:p="http://schemas.openxmlformats.org/presentationml/2006/main">
+  <p:cSld>
+    <p:spTree>
+      <p:nvGrpSpPr>
+        <p:cNvPr id="1" name=""/>
+        <p:cNvGrpSpPr/>
+        <p:nvPr/>
+      </p:nvGrpSpPr>
+      <p:grpSpPr>
+        <a:xfrm>
+          <a:off x="0" y="0"/>
+          <a:ext cx="0" cy="0"/>
+          <a:chOff x="0" y="0"/>
+          <a:chExt cx="0" cy="0"/>
+        </a:xfrm>
+      </p:grpSpPr>
+      <p:sp>
+        <p:nvSpPr>
+          <p:cNvPr id="2" name="Title 1">
+            <a:extLst>
+              <a:ext uri="{FF2B5EF4-FFF2-40B4-BE49-F238E27FC236}">
+                <a16:creationId xmlns:a16="http://schemas.microsoft.com/office/drawing/2014/main" id="{1C0F531D-2E5A-48E6-A011-E7FCDA2FD82A}"/>
+              </a:ext>
+            </a:extLst>
+          </p:cNvPr>
+          <p:cNvSpPr>
+            <a:spLocks noGrp="1"/>
+          </p:cNvSpPr>
+          <p:nvPr>
+            <p:ph type="ctrTitle"/>
+          </p:nvPr>
+        </p:nvSpPr>
+        <p:spPr>
+          <a:xfrm>
+            <a:off x="1202724" y="1380068"/>
+            <a:ext cx="10300299" cy="2616199"/>
+          </a:xfrm>
+        </p:spPr>
+        <p:txBody>
+          <a:bodyPr/>
+          <a:lstStyle/>
+          <a:p>
+            <a:pPr algn="ctr"/>
+            <a:r>
+              <a:rPr lang="en-US" dirty="0"/>
+              <a:t>Methodology</a:t>
+            </a:r>
+          </a:p>
+        </p:txBody>
+      </p:sp>
+      <p:sp>
+        <p:nvSpPr>
+          <p:cNvPr id="3" name="Subtitle 2">
+            <a:extLst>
+              <a:ext uri="{FF2B5EF4-FFF2-40B4-BE49-F238E27FC236}">
+                <a16:creationId xmlns:a16="http://schemas.microsoft.com/office/drawing/2014/main" id="{4AB2CF1C-400D-4F1D-85F6-FC716B53C2B2}"/>
+              </a:ext>
+            </a:extLst>
+          </p:cNvPr>
+          <p:cNvSpPr>
+            <a:spLocks noGrp="1"/>
+          </p:cNvSpPr>
+          <p:nvPr>
+            <p:ph type="subTitle" idx="1"/>
+          </p:nvPr>
+        </p:nvSpPr>
+        <p:spPr/>
+        <p:txBody>
+          <a:bodyPr/>
+          <a:lstStyle/>
+          <a:p>
+            <a:endParaRPr lang="en-US"/>
+          </a:p>
+        </p:txBody>
+      </p:sp>
+    </p:spTree>
+    <p:extLst>
+      <p:ext uri="{BB962C8B-B14F-4D97-AF65-F5344CB8AC3E}">
+        <p14:creationId xmlns:p14="http://schemas.microsoft.com/office/powerpoint/2010/main" val="1345785651"/>
+      </p:ext>
+    </p:extLst>
+  </p:cSld>
+  <p:clrMapOvr>
+    <a:masterClrMapping/>
+  </p:clrMapOvr>
+</p:sld>
+</file>
+
+<file path=ppt/slides/slide8.xml><?xml version="1.0" encoding="utf-8"?>
+<p:sld xmlns:a="http://schemas.openxmlformats.org/drawingml/2006/main" xmlns:r="http://schemas.openxmlformats.org/officeDocument/2006/relationships" xmlns:p="http://schemas.openxmlformats.org/presentationml/2006/main">
+  <p:cSld>
+    <p:spTree>
+      <p:nvGrpSpPr>
+        <p:cNvPr id="1" name=""/>
+        <p:cNvGrpSpPr/>
+        <p:nvPr/>
+      </p:nvGrpSpPr>
+      <p:grpSpPr>
+        <a:xfrm>
+          <a:off x="0" y="0"/>
+          <a:ext cx="0" cy="0"/>
+          <a:chOff x="0" y="0"/>
+          <a:chExt cx="0" cy="0"/>
+        </a:xfrm>
+      </p:grpSpPr>
+      <p:sp>
+        <p:nvSpPr>
+          <p:cNvPr id="2" name="Title 1">
+            <a:extLst>
+              <a:ext uri="{FF2B5EF4-FFF2-40B4-BE49-F238E27FC236}">
+                <a16:creationId xmlns:a16="http://schemas.microsoft.com/office/drawing/2014/main" id="{63B25B84-1C8F-4167-A95B-5430FE55CC20}"/>
+              </a:ext>
+            </a:extLst>
+          </p:cNvPr>
+          <p:cNvSpPr>
+            <a:spLocks noGrp="1"/>
+          </p:cNvSpPr>
+          <p:nvPr>
+            <p:ph type="title"/>
+          </p:nvPr>
+        </p:nvSpPr>
+        <p:spPr/>
+        <p:txBody>
+          <a:bodyPr/>
+          <a:lstStyle/>
+          <a:p>
+            <a:r>
+              <a:rPr lang="en-US" dirty="0"/>
+              <a:t>Algorithm Overview</a:t>
+            </a:r>
+          </a:p>
+        </p:txBody>
+      </p:sp>
+      <p:sp>
+        <p:nvSpPr>
+          <p:cNvPr id="3" name="Content Placeholder 2">
+            <a:extLst>
+              <a:ext uri="{FF2B5EF4-FFF2-40B4-BE49-F238E27FC236}">
+                <a16:creationId xmlns:a16="http://schemas.microsoft.com/office/drawing/2014/main" id="{99B09556-7ED0-40D9-B014-37EB5149897C}"/>
+              </a:ext>
+            </a:extLst>
+          </p:cNvPr>
+          <p:cNvSpPr>
+            <a:spLocks noGrp="1"/>
+          </p:cNvSpPr>
+          <p:nvPr>
+            <p:ph idx="1"/>
+          </p:nvPr>
+        </p:nvSpPr>
+        <p:spPr/>
+        <p:txBody>
+          <a:bodyPr/>
+          <a:lstStyle/>
+          <a:p>
+            <a:endParaRPr lang="en-US"/>
+          </a:p>
+        </p:txBody>
+      </p:sp>
+    </p:spTree>
+    <p:extLst>
+      <p:ext uri="{BB962C8B-B14F-4D97-AF65-F5344CB8AC3E}">
+        <p14:creationId xmlns:p14="http://schemas.microsoft.com/office/powerpoint/2010/main" val="2443630348"/>
+      </p:ext>
+    </p:extLst>
+  </p:cSld>
+  <p:clrMapOvr>
+    <a:masterClrMapping/>
+  </p:clrMapOvr>
+</p:sld>
+</file>
+
+<file path=ppt/slides/slide9.xml><?xml version="1.0" encoding="utf-8"?>
+<p:sld xmlns:a="http://schemas.openxmlformats.org/drawingml/2006/main" xmlns:r="http://schemas.openxmlformats.org/officeDocument/2006/relationships" xmlns:p="http://schemas.openxmlformats.org/presentationml/2006/main">
+  <p:cSld>
+    <p:spTree>
+      <p:nvGrpSpPr>
+        <p:cNvPr id="1" name=""/>
+        <p:cNvGrpSpPr/>
+        <p:nvPr/>
+      </p:nvGrpSpPr>
+      <p:grpSpPr>
+        <a:xfrm>
+          <a:off x="0" y="0"/>
+          <a:ext cx="0" cy="0"/>
+          <a:chOff x="0" y="0"/>
+          <a:chExt cx="0" cy="0"/>
+        </a:xfrm>
+      </p:grpSpPr>
+      <p:sp>
+        <p:nvSpPr>
+          <p:cNvPr id="2" name="Title 1">
+            <a:extLst>
+              <a:ext uri="{FF2B5EF4-FFF2-40B4-BE49-F238E27FC236}">
+                <a16:creationId xmlns:a16="http://schemas.microsoft.com/office/drawing/2014/main" id="{EFE7DCDA-4BBD-4183-BCD5-1E0C87414CE6}"/>
+              </a:ext>
+            </a:extLst>
+          </p:cNvPr>
+          <p:cNvSpPr>
+            <a:spLocks noGrp="1"/>
+          </p:cNvSpPr>
+          <p:nvPr>
+            <p:ph type="title"/>
+          </p:nvPr>
+        </p:nvSpPr>
+        <p:spPr/>
+        <p:txBody>
+          <a:bodyPr/>
+          <a:lstStyle/>
+          <a:p>
+            <a:r>
+              <a:rPr lang="en-US" dirty="0"/>
+              <a:t>Implementation Details</a:t>
+            </a:r>
+          </a:p>
+        </p:txBody>
+      </p:sp>
+      <p:sp>
+        <p:nvSpPr>
+          <p:cNvPr id="3" name="Content Placeholder 2">
+            <a:extLst>
+              <a:ext uri="{FF2B5EF4-FFF2-40B4-BE49-F238E27FC236}">
+                <a16:creationId xmlns:a16="http://schemas.microsoft.com/office/drawing/2014/main" id="{9E5D62F0-7E36-473A-9A3F-1A920505E26D}"/>
+              </a:ext>
+            </a:extLst>
+          </p:cNvPr>
+          <p:cNvSpPr>
+            <a:spLocks noGrp="1"/>
+          </p:cNvSpPr>
+          <p:nvPr>
+            <p:ph idx="1"/>
+          </p:nvPr>
+        </p:nvSpPr>
+        <p:spPr/>
+        <p:txBody>
+          <a:bodyPr/>
+          <a:lstStyle/>
+          <a:p>
+            <a:endParaRPr lang="en-US"/>
+          </a:p>
+        </p:txBody>
+      </p:sp>
+    </p:spTree>
+    <p:extLst>
+      <p:ext uri="{BB962C8B-B14F-4D97-AF65-F5344CB8AC3E}">
+        <p14:creationId xmlns:p14="http://schemas.microsoft.com/office/powerpoint/2010/main" val="2441725131"/>
       </p:ext>
     </p:extLst>
   </p:cSld>

</xml_diff>

<commit_message>
Update AI TermProject Presentation.pptx
</commit_message>
<xml_diff>
--- a/AI TermProject Presentation.pptx
+++ b/AI TermProject Presentation.pptx
@@ -14,21 +14,23 @@
     <p:sldId id="269" r:id="rId8"/>
     <p:sldId id="263" r:id="rId9"/>
     <p:sldId id="283" r:id="rId10"/>
-    <p:sldId id="264" r:id="rId11"/>
-    <p:sldId id="270" r:id="rId12"/>
-    <p:sldId id="265" r:id="rId13"/>
-    <p:sldId id="278" r:id="rId14"/>
-    <p:sldId id="279" r:id="rId15"/>
-    <p:sldId id="280" r:id="rId16"/>
-    <p:sldId id="281" r:id="rId17"/>
-    <p:sldId id="282" r:id="rId18"/>
-    <p:sldId id="271" r:id="rId19"/>
-    <p:sldId id="266" r:id="rId20"/>
-    <p:sldId id="273" r:id="rId21"/>
-    <p:sldId id="272" r:id="rId22"/>
-    <p:sldId id="267" r:id="rId23"/>
-    <p:sldId id="268" r:id="rId24"/>
-    <p:sldId id="276" r:id="rId25"/>
+    <p:sldId id="284" r:id="rId11"/>
+    <p:sldId id="285" r:id="rId12"/>
+    <p:sldId id="264" r:id="rId13"/>
+    <p:sldId id="270" r:id="rId14"/>
+    <p:sldId id="265" r:id="rId15"/>
+    <p:sldId id="278" r:id="rId16"/>
+    <p:sldId id="279" r:id="rId17"/>
+    <p:sldId id="280" r:id="rId18"/>
+    <p:sldId id="281" r:id="rId19"/>
+    <p:sldId id="282" r:id="rId20"/>
+    <p:sldId id="271" r:id="rId21"/>
+    <p:sldId id="266" r:id="rId22"/>
+    <p:sldId id="273" r:id="rId23"/>
+    <p:sldId id="272" r:id="rId24"/>
+    <p:sldId id="267" r:id="rId25"/>
+    <p:sldId id="268" r:id="rId26"/>
+    <p:sldId id="276" r:id="rId27"/>
   </p:sldIdLst>
   <p:sldSz cx="12192000" cy="6858000"/>
   <p:notesSz cx="6858000" cy="9144000"/>
@@ -6266,7 +6268,7 @@
           <p:cNvPr id="2" name="Title 1">
             <a:extLst>
               <a:ext uri="{FF2B5EF4-FFF2-40B4-BE49-F238E27FC236}">
-                <a16:creationId xmlns:a16="http://schemas.microsoft.com/office/drawing/2014/main" id="{EFE7DCDA-4BBD-4183-BCD5-1E0C87414CE6}"/>
+                <a16:creationId xmlns:a16="http://schemas.microsoft.com/office/drawing/2014/main" id="{63B25B84-1C8F-4167-A95B-5430FE55CC20}"/>
               </a:ext>
             </a:extLst>
           </p:cNvPr>
@@ -6284,7 +6286,7 @@
           <a:p>
             <a:r>
               <a:rPr lang="en-US" dirty="0"/>
-              <a:t>Implementation Details</a:t>
+              <a:t>Client-Server Application</a:t>
             </a:r>
           </a:p>
         </p:txBody>
@@ -6294,7 +6296,7 @@
           <p:cNvPr id="3" name="Content Placeholder 2">
             <a:extLst>
               <a:ext uri="{FF2B5EF4-FFF2-40B4-BE49-F238E27FC236}">
-                <a16:creationId xmlns:a16="http://schemas.microsoft.com/office/drawing/2014/main" id="{9E5D62F0-7E36-473A-9A3F-1A920505E26D}"/>
+                <a16:creationId xmlns:a16="http://schemas.microsoft.com/office/drawing/2014/main" id="{99B09556-7ED0-40D9-B014-37EB5149897C}"/>
               </a:ext>
             </a:extLst>
           </p:cNvPr>
@@ -6312,6 +6314,47 @@
           </a:bodyPr>
           <a:lstStyle/>
           <a:p>
+            <a:r>
+              <a:rPr lang="en-US" dirty="0"/>
+              <a:t>Front-end Architecture:</a:t>
+            </a:r>
+          </a:p>
+          <a:p>
+            <a:pPr lvl="1"/>
+            <a:r>
+              <a:rPr lang="en-US" dirty="0"/>
+              <a:t>Utilization of Bootstrap, HTML, CSS, and JavaScript for constructing an interface.</a:t>
+            </a:r>
+          </a:p>
+          <a:p>
+            <a:pPr lvl="1"/>
+            <a:r>
+              <a:rPr lang="en-US" dirty="0"/>
+              <a:t>Two web pages with similar layouts:</a:t>
+            </a:r>
+          </a:p>
+          <a:p>
+            <a:pPr lvl="2"/>
+            <a:r>
+              <a:rPr lang="en-US" dirty="0"/>
+              <a:t>Input Page</a:t>
+            </a:r>
+          </a:p>
+          <a:p>
+            <a:pPr lvl="2"/>
+            <a:r>
+              <a:rPr lang="en-US" dirty="0"/>
+              <a:t>Solve Page</a:t>
+            </a:r>
+          </a:p>
+          <a:p>
+            <a:pPr lvl="1"/>
+            <a:r>
+              <a:rPr lang="en-US" dirty="0"/>
+              <a:t>Implementation of JavaScript's fetch requests for server interaction.</a:t>
+            </a:r>
+          </a:p>
+          <a:p>
             <a:endParaRPr lang="en-US" dirty="0"/>
           </a:p>
         </p:txBody>
@@ -6319,7 +6362,7 @@
     </p:spTree>
     <p:extLst>
       <p:ext uri="{BB962C8B-B14F-4D97-AF65-F5344CB8AC3E}">
-        <p14:creationId xmlns:p14="http://schemas.microsoft.com/office/powerpoint/2010/main" val="2441725131"/>
+        <p14:creationId xmlns:p14="http://schemas.microsoft.com/office/powerpoint/2010/main" val="1887315578"/>
       </p:ext>
     </p:extLst>
   </p:cSld>
@@ -6351,7 +6394,7 @@
           <p:cNvPr id="2" name="Title 1">
             <a:extLst>
               <a:ext uri="{FF2B5EF4-FFF2-40B4-BE49-F238E27FC236}">
-                <a16:creationId xmlns:a16="http://schemas.microsoft.com/office/drawing/2014/main" id="{1C0F531D-2E5A-48E6-A011-E7FCDA2FD82A}"/>
+                <a16:creationId xmlns:a16="http://schemas.microsoft.com/office/drawing/2014/main" id="{63B25B84-1C8F-4167-A95B-5430FE55CC20}"/>
               </a:ext>
             </a:extLst>
           </p:cNvPr>
@@ -6359,33 +6402,27 @@
             <a:spLocks noGrp="1"/>
           </p:cNvSpPr>
           <p:nvPr>
-            <p:ph type="ctrTitle"/>
-          </p:nvPr>
-        </p:nvSpPr>
-        <p:spPr>
-          <a:xfrm>
-            <a:off x="1202724" y="1380068"/>
-            <a:ext cx="10300299" cy="2616199"/>
-          </a:xfrm>
-        </p:spPr>
+            <p:ph type="title"/>
+          </p:nvPr>
+        </p:nvSpPr>
+        <p:spPr/>
         <p:txBody>
           <a:bodyPr/>
           <a:lstStyle/>
           <a:p>
-            <a:pPr algn="ctr"/>
-            <a:r>
-              <a:rPr lang="en-US" dirty="0"/>
-              <a:t>Results</a:t>
-            </a:r>
-          </a:p>
-        </p:txBody>
-      </p:sp>
-      <p:sp>
-        <p:nvSpPr>
-          <p:cNvPr id="3" name="Subtitle 2">
+            <a:r>
+              <a:rPr lang="en-US" dirty="0"/>
+              <a:t>Client-Server Application</a:t>
+            </a:r>
+          </a:p>
+        </p:txBody>
+      </p:sp>
+      <p:sp>
+        <p:nvSpPr>
+          <p:cNvPr id="3" name="Content Placeholder 2">
             <a:extLst>
               <a:ext uri="{FF2B5EF4-FFF2-40B4-BE49-F238E27FC236}">
-                <a16:creationId xmlns:a16="http://schemas.microsoft.com/office/drawing/2014/main" id="{4AB2CF1C-400D-4F1D-85F6-FC716B53C2B2}"/>
+                <a16:creationId xmlns:a16="http://schemas.microsoft.com/office/drawing/2014/main" id="{99B09556-7ED0-40D9-B014-37EB5149897C}"/>
               </a:ext>
             </a:extLst>
           </p:cNvPr>
@@ -6393,22 +6430,88 @@
             <a:spLocks noGrp="1"/>
           </p:cNvSpPr>
           <p:nvPr>
-            <p:ph type="subTitle" idx="1"/>
+            <p:ph idx="1"/>
           </p:nvPr>
         </p:nvSpPr>
         <p:spPr/>
         <p:txBody>
-          <a:bodyPr/>
-          <a:lstStyle/>
-          <a:p>
-            <a:endParaRPr lang="en-US"/>
+          <a:bodyPr>
+            <a:normAutofit fontScale="92500" lnSpcReduction="10000"/>
+          </a:bodyPr>
+          <a:lstStyle/>
+          <a:p>
+            <a:r>
+              <a:rPr lang="en-US" dirty="0"/>
+              <a:t>Back-end Infrastructure:</a:t>
+            </a:r>
+          </a:p>
+          <a:p>
+            <a:pPr lvl="1"/>
+            <a:r>
+              <a:rPr lang="en-US" dirty="0"/>
+              <a:t>Flask framework to establish a server.</a:t>
+            </a:r>
+          </a:p>
+          <a:p>
+            <a:pPr lvl="1"/>
+            <a:r>
+              <a:rPr lang="en-US" dirty="0"/>
+              <a:t>Flask routing client requests to distinct functions.</a:t>
+            </a:r>
+          </a:p>
+          <a:p>
+            <a:pPr lvl="1"/>
+            <a:r>
+              <a:rPr lang="en-US" dirty="0"/>
+              <a:t>Primary functions:</a:t>
+            </a:r>
+          </a:p>
+          <a:p>
+            <a:pPr lvl="2"/>
+            <a:r>
+              <a:rPr lang="en-US" dirty="0"/>
+              <a:t>"</a:t>
+            </a:r>
+            <a:r>
+              <a:rPr lang="en-US" dirty="0" err="1"/>
+              <a:t>serve_html</a:t>
+            </a:r>
+            <a:r>
+              <a:rPr lang="en-US" dirty="0"/>
+              <a:t>" serves HTML files upon client requests, locating and returning specified files.</a:t>
+            </a:r>
+          </a:p>
+          <a:p>
+            <a:pPr lvl="2"/>
+            <a:r>
+              <a:rPr lang="en-US" dirty="0"/>
+              <a:t>"</a:t>
+            </a:r>
+            <a:r>
+              <a:rPr lang="en-US" dirty="0" err="1"/>
+              <a:t>customBoard</a:t>
+            </a:r>
+            <a:r>
+              <a:rPr lang="en-US" dirty="0"/>
+              <a:t>" enables users to submit Sudoku game boards, initiating solution search..</a:t>
+            </a:r>
+          </a:p>
+          <a:p>
+            <a:pPr lvl="1"/>
+            <a:r>
+              <a:rPr lang="en-US" dirty="0"/>
+              <a:t>Auxiliary functions for data transformation into JSON format, facilitating communication between front-end and back-end components.</a:t>
+            </a:r>
+          </a:p>
+          <a:p>
+            <a:endParaRPr lang="en-US" dirty="0"/>
           </a:p>
         </p:txBody>
       </p:sp>
     </p:spTree>
     <p:extLst>
       <p:ext uri="{BB962C8B-B14F-4D97-AF65-F5344CB8AC3E}">
-        <p14:creationId xmlns:p14="http://schemas.microsoft.com/office/powerpoint/2010/main" val="2432444303"/>
+        <p14:creationId xmlns:p14="http://schemas.microsoft.com/office/powerpoint/2010/main" val="3199659891"/>
       </p:ext>
     </p:extLst>
   </p:cSld>
@@ -6440,6 +6543,180 @@
           <p:cNvPr id="2" name="Title 1">
             <a:extLst>
               <a:ext uri="{FF2B5EF4-FFF2-40B4-BE49-F238E27FC236}">
+                <a16:creationId xmlns:a16="http://schemas.microsoft.com/office/drawing/2014/main" id="{EFE7DCDA-4BBD-4183-BCD5-1E0C87414CE6}"/>
+              </a:ext>
+            </a:extLst>
+          </p:cNvPr>
+          <p:cNvSpPr>
+            <a:spLocks noGrp="1"/>
+          </p:cNvSpPr>
+          <p:nvPr>
+            <p:ph type="title"/>
+          </p:nvPr>
+        </p:nvSpPr>
+        <p:spPr/>
+        <p:txBody>
+          <a:bodyPr/>
+          <a:lstStyle/>
+          <a:p>
+            <a:r>
+              <a:rPr lang="en-US" dirty="0"/>
+              <a:t>Implementation Details</a:t>
+            </a:r>
+          </a:p>
+        </p:txBody>
+      </p:sp>
+      <p:sp>
+        <p:nvSpPr>
+          <p:cNvPr id="3" name="Content Placeholder 2">
+            <a:extLst>
+              <a:ext uri="{FF2B5EF4-FFF2-40B4-BE49-F238E27FC236}">
+                <a16:creationId xmlns:a16="http://schemas.microsoft.com/office/drawing/2014/main" id="{9E5D62F0-7E36-473A-9A3F-1A920505E26D}"/>
+              </a:ext>
+            </a:extLst>
+          </p:cNvPr>
+          <p:cNvSpPr>
+            <a:spLocks noGrp="1"/>
+          </p:cNvSpPr>
+          <p:nvPr>
+            <p:ph idx="1"/>
+          </p:nvPr>
+        </p:nvSpPr>
+        <p:spPr/>
+        <p:txBody>
+          <a:bodyPr>
+            <a:normAutofit/>
+          </a:bodyPr>
+          <a:lstStyle/>
+          <a:p>
+            <a:endParaRPr lang="en-US" dirty="0"/>
+          </a:p>
+        </p:txBody>
+      </p:sp>
+    </p:spTree>
+    <p:extLst>
+      <p:ext uri="{BB962C8B-B14F-4D97-AF65-F5344CB8AC3E}">
+        <p14:creationId xmlns:p14="http://schemas.microsoft.com/office/powerpoint/2010/main" val="2441725131"/>
+      </p:ext>
+    </p:extLst>
+  </p:cSld>
+  <p:clrMapOvr>
+    <a:masterClrMapping/>
+  </p:clrMapOvr>
+</p:sld>
+</file>
+
+<file path=ppt/slides/slide13.xml><?xml version="1.0" encoding="utf-8"?>
+<p:sld xmlns:a="http://schemas.openxmlformats.org/drawingml/2006/main" xmlns:r="http://schemas.openxmlformats.org/officeDocument/2006/relationships" xmlns:p="http://schemas.openxmlformats.org/presentationml/2006/main">
+  <p:cSld>
+    <p:spTree>
+      <p:nvGrpSpPr>
+        <p:cNvPr id="1" name=""/>
+        <p:cNvGrpSpPr/>
+        <p:nvPr/>
+      </p:nvGrpSpPr>
+      <p:grpSpPr>
+        <a:xfrm>
+          <a:off x="0" y="0"/>
+          <a:ext cx="0" cy="0"/>
+          <a:chOff x="0" y="0"/>
+          <a:chExt cx="0" cy="0"/>
+        </a:xfrm>
+      </p:grpSpPr>
+      <p:sp>
+        <p:nvSpPr>
+          <p:cNvPr id="2" name="Title 1">
+            <a:extLst>
+              <a:ext uri="{FF2B5EF4-FFF2-40B4-BE49-F238E27FC236}">
+                <a16:creationId xmlns:a16="http://schemas.microsoft.com/office/drawing/2014/main" id="{1C0F531D-2E5A-48E6-A011-E7FCDA2FD82A}"/>
+              </a:ext>
+            </a:extLst>
+          </p:cNvPr>
+          <p:cNvSpPr>
+            <a:spLocks noGrp="1"/>
+          </p:cNvSpPr>
+          <p:nvPr>
+            <p:ph type="ctrTitle"/>
+          </p:nvPr>
+        </p:nvSpPr>
+        <p:spPr>
+          <a:xfrm>
+            <a:off x="1202724" y="1380068"/>
+            <a:ext cx="10300299" cy="2616199"/>
+          </a:xfrm>
+        </p:spPr>
+        <p:txBody>
+          <a:bodyPr/>
+          <a:lstStyle/>
+          <a:p>
+            <a:pPr algn="ctr"/>
+            <a:r>
+              <a:rPr lang="en-US" dirty="0"/>
+              <a:t>Results</a:t>
+            </a:r>
+          </a:p>
+        </p:txBody>
+      </p:sp>
+      <p:sp>
+        <p:nvSpPr>
+          <p:cNvPr id="3" name="Subtitle 2">
+            <a:extLst>
+              <a:ext uri="{FF2B5EF4-FFF2-40B4-BE49-F238E27FC236}">
+                <a16:creationId xmlns:a16="http://schemas.microsoft.com/office/drawing/2014/main" id="{4AB2CF1C-400D-4F1D-85F6-FC716B53C2B2}"/>
+              </a:ext>
+            </a:extLst>
+          </p:cNvPr>
+          <p:cNvSpPr>
+            <a:spLocks noGrp="1"/>
+          </p:cNvSpPr>
+          <p:nvPr>
+            <p:ph type="subTitle" idx="1"/>
+          </p:nvPr>
+        </p:nvSpPr>
+        <p:spPr/>
+        <p:txBody>
+          <a:bodyPr/>
+          <a:lstStyle/>
+          <a:p>
+            <a:endParaRPr lang="en-US"/>
+          </a:p>
+        </p:txBody>
+      </p:sp>
+    </p:spTree>
+    <p:extLst>
+      <p:ext uri="{BB962C8B-B14F-4D97-AF65-F5344CB8AC3E}">
+        <p14:creationId xmlns:p14="http://schemas.microsoft.com/office/powerpoint/2010/main" val="2432444303"/>
+      </p:ext>
+    </p:extLst>
+  </p:cSld>
+  <p:clrMapOvr>
+    <a:masterClrMapping/>
+  </p:clrMapOvr>
+</p:sld>
+</file>
+
+<file path=ppt/slides/slide14.xml><?xml version="1.0" encoding="utf-8"?>
+<p:sld xmlns:a="http://schemas.openxmlformats.org/drawingml/2006/main" xmlns:r="http://schemas.openxmlformats.org/officeDocument/2006/relationships" xmlns:p="http://schemas.openxmlformats.org/presentationml/2006/main">
+  <p:cSld>
+    <p:spTree>
+      <p:nvGrpSpPr>
+        <p:cNvPr id="1" name=""/>
+        <p:cNvGrpSpPr/>
+        <p:nvPr/>
+      </p:nvGrpSpPr>
+      <p:grpSpPr>
+        <a:xfrm>
+          <a:off x="0" y="0"/>
+          <a:ext cx="0" cy="0"/>
+          <a:chOff x="0" y="0"/>
+          <a:chExt cx="0" cy="0"/>
+        </a:xfrm>
+      </p:grpSpPr>
+      <p:sp>
+        <p:nvSpPr>
+          <p:cNvPr id="2" name="Title 1">
+            <a:extLst>
+              <a:ext uri="{FF2B5EF4-FFF2-40B4-BE49-F238E27FC236}">
                 <a16:creationId xmlns:a16="http://schemas.microsoft.com/office/drawing/2014/main" id="{59FC0C5C-6773-4A21-B325-21606F5EBD9F}"/>
               </a:ext>
             </a:extLst>
@@ -6510,7 +6787,7 @@
 </p:sld>
 </file>
 
-<file path=ppt/slides/slide13.xml><?xml version="1.0" encoding="utf-8"?>
+<file path=ppt/slides/slide15.xml><?xml version="1.0" encoding="utf-8"?>
 <p:sld xmlns:a="http://schemas.openxmlformats.org/drawingml/2006/main" xmlns:r="http://schemas.openxmlformats.org/officeDocument/2006/relationships" xmlns:p="http://schemas.openxmlformats.org/presentationml/2006/main">
   <p:cSld>
     <p:spTree>
@@ -6760,7 +7037,7 @@
 </p:sld>
 </file>
 
-<file path=ppt/slides/slide14.xml><?xml version="1.0" encoding="utf-8"?>
+<file path=ppt/slides/slide16.xml><?xml version="1.0" encoding="utf-8"?>
 <p:sld xmlns:a="http://schemas.openxmlformats.org/drawingml/2006/main" xmlns:r="http://schemas.openxmlformats.org/officeDocument/2006/relationships" xmlns:p="http://schemas.openxmlformats.org/presentationml/2006/main">
   <p:cSld>
     <p:spTree>
@@ -7007,7 +7284,7 @@
 </p:sld>
 </file>
 
-<file path=ppt/slides/slide15.xml><?xml version="1.0" encoding="utf-8"?>
+<file path=ppt/slides/slide17.xml><?xml version="1.0" encoding="utf-8"?>
 <p:sld xmlns:a="http://schemas.openxmlformats.org/drawingml/2006/main" xmlns:r="http://schemas.openxmlformats.org/officeDocument/2006/relationships" xmlns:p="http://schemas.openxmlformats.org/presentationml/2006/main">
   <p:cSld>
     <p:spTree>
@@ -7254,7 +7531,7 @@
 </p:sld>
 </file>
 
-<file path=ppt/slides/slide16.xml><?xml version="1.0" encoding="utf-8"?>
+<file path=ppt/slides/slide18.xml><?xml version="1.0" encoding="utf-8"?>
 <p:sld xmlns:a="http://schemas.openxmlformats.org/drawingml/2006/main" xmlns:r="http://schemas.openxmlformats.org/officeDocument/2006/relationships" xmlns:p="http://schemas.openxmlformats.org/presentationml/2006/main">
   <p:cSld>
     <p:spTree>
@@ -7471,7 +7748,7 @@
 </p:sld>
 </file>
 
-<file path=ppt/slides/slide17.xml><?xml version="1.0" encoding="utf-8"?>
+<file path=ppt/slides/slide19.xml><?xml version="1.0" encoding="utf-8"?>
 <p:sld xmlns:a="http://schemas.openxmlformats.org/drawingml/2006/main" xmlns:r="http://schemas.openxmlformats.org/officeDocument/2006/relationships" xmlns:p="http://schemas.openxmlformats.org/presentationml/2006/main">
   <p:cSld>
     <p:spTree>
@@ -7723,237 +8000,6 @@
 </p:sld>
 </file>
 
-<file path=ppt/slides/slide18.xml><?xml version="1.0" encoding="utf-8"?>
-<p:sld xmlns:a="http://schemas.openxmlformats.org/drawingml/2006/main" xmlns:r="http://schemas.openxmlformats.org/officeDocument/2006/relationships" xmlns:p="http://schemas.openxmlformats.org/presentationml/2006/main">
-  <p:cSld>
-    <p:spTree>
-      <p:nvGrpSpPr>
-        <p:cNvPr id="1" name=""/>
-        <p:cNvGrpSpPr/>
-        <p:nvPr/>
-      </p:nvGrpSpPr>
-      <p:grpSpPr>
-        <a:xfrm>
-          <a:off x="0" y="0"/>
-          <a:ext cx="0" cy="0"/>
-          <a:chOff x="0" y="0"/>
-          <a:chExt cx="0" cy="0"/>
-        </a:xfrm>
-      </p:grpSpPr>
-      <p:sp>
-        <p:nvSpPr>
-          <p:cNvPr id="2" name="Title 1">
-            <a:extLst>
-              <a:ext uri="{FF2B5EF4-FFF2-40B4-BE49-F238E27FC236}">
-                <a16:creationId xmlns:a16="http://schemas.microsoft.com/office/drawing/2014/main" id="{1C0F531D-2E5A-48E6-A011-E7FCDA2FD82A}"/>
-              </a:ext>
-            </a:extLst>
-          </p:cNvPr>
-          <p:cNvSpPr>
-            <a:spLocks noGrp="1"/>
-          </p:cNvSpPr>
-          <p:nvPr>
-            <p:ph type="ctrTitle"/>
-          </p:nvPr>
-        </p:nvSpPr>
-        <p:spPr>
-          <a:xfrm>
-            <a:off x="1202724" y="1380068"/>
-            <a:ext cx="10300299" cy="2616199"/>
-          </a:xfrm>
-        </p:spPr>
-        <p:txBody>
-          <a:bodyPr/>
-          <a:lstStyle/>
-          <a:p>
-            <a:pPr algn="ctr"/>
-            <a:r>
-              <a:rPr lang="en-US" dirty="0"/>
-              <a:t>Discussion</a:t>
-            </a:r>
-          </a:p>
-        </p:txBody>
-      </p:sp>
-      <p:sp>
-        <p:nvSpPr>
-          <p:cNvPr id="3" name="Subtitle 2">
-            <a:extLst>
-              <a:ext uri="{FF2B5EF4-FFF2-40B4-BE49-F238E27FC236}">
-                <a16:creationId xmlns:a16="http://schemas.microsoft.com/office/drawing/2014/main" id="{4AB2CF1C-400D-4F1D-85F6-FC716B53C2B2}"/>
-              </a:ext>
-            </a:extLst>
-          </p:cNvPr>
-          <p:cNvSpPr>
-            <a:spLocks noGrp="1"/>
-          </p:cNvSpPr>
-          <p:nvPr>
-            <p:ph type="subTitle" idx="1"/>
-          </p:nvPr>
-        </p:nvSpPr>
-        <p:spPr/>
-        <p:txBody>
-          <a:bodyPr/>
-          <a:lstStyle/>
-          <a:p>
-            <a:endParaRPr lang="en-US"/>
-          </a:p>
-        </p:txBody>
-      </p:sp>
-    </p:spTree>
-    <p:extLst>
-      <p:ext uri="{BB962C8B-B14F-4D97-AF65-F5344CB8AC3E}">
-        <p14:creationId xmlns:p14="http://schemas.microsoft.com/office/powerpoint/2010/main" val="1860840868"/>
-      </p:ext>
-    </p:extLst>
-  </p:cSld>
-  <p:clrMapOvr>
-    <a:masterClrMapping/>
-  </p:clrMapOvr>
-</p:sld>
-</file>
-
-<file path=ppt/slides/slide19.xml><?xml version="1.0" encoding="utf-8"?>
-<p:sld xmlns:a="http://schemas.openxmlformats.org/drawingml/2006/main" xmlns:r="http://schemas.openxmlformats.org/officeDocument/2006/relationships" xmlns:p="http://schemas.openxmlformats.org/presentationml/2006/main">
-  <p:cSld>
-    <p:spTree>
-      <p:nvGrpSpPr>
-        <p:cNvPr id="1" name=""/>
-        <p:cNvGrpSpPr/>
-        <p:nvPr/>
-      </p:nvGrpSpPr>
-      <p:grpSpPr>
-        <a:xfrm>
-          <a:off x="0" y="0"/>
-          <a:ext cx="0" cy="0"/>
-          <a:chOff x="0" y="0"/>
-          <a:chExt cx="0" cy="0"/>
-        </a:xfrm>
-      </p:grpSpPr>
-      <p:sp>
-        <p:nvSpPr>
-          <p:cNvPr id="2" name="Title 1">
-            <a:extLst>
-              <a:ext uri="{FF2B5EF4-FFF2-40B4-BE49-F238E27FC236}">
-                <a16:creationId xmlns:a16="http://schemas.microsoft.com/office/drawing/2014/main" id="{8580EFEF-5D64-41E2-BF19-44D99FD56027}"/>
-              </a:ext>
-            </a:extLst>
-          </p:cNvPr>
-          <p:cNvSpPr>
-            <a:spLocks noGrp="1"/>
-          </p:cNvSpPr>
-          <p:nvPr>
-            <p:ph type="title"/>
-          </p:nvPr>
-        </p:nvSpPr>
-        <p:spPr/>
-        <p:txBody>
-          <a:bodyPr/>
-          <a:lstStyle/>
-          <a:p>
-            <a:r>
-              <a:rPr lang="en-US" dirty="0"/>
-              <a:t>Efficiency Evaluation</a:t>
-            </a:r>
-          </a:p>
-        </p:txBody>
-      </p:sp>
-      <p:sp>
-        <p:nvSpPr>
-          <p:cNvPr id="3" name="Content Placeholder 2">
-            <a:extLst>
-              <a:ext uri="{FF2B5EF4-FFF2-40B4-BE49-F238E27FC236}">
-                <a16:creationId xmlns:a16="http://schemas.microsoft.com/office/drawing/2014/main" id="{7563D280-FB6D-41D0-A29D-EFBD6657F5F6}"/>
-              </a:ext>
-            </a:extLst>
-          </p:cNvPr>
-          <p:cNvSpPr>
-            <a:spLocks noGrp="1"/>
-          </p:cNvSpPr>
-          <p:nvPr>
-            <p:ph idx="1"/>
-          </p:nvPr>
-        </p:nvSpPr>
-        <p:spPr/>
-        <p:txBody>
-          <a:bodyPr>
-            <a:normAutofit/>
-          </a:bodyPr>
-          <a:lstStyle/>
-          <a:p>
-            <a:r>
-              <a:rPr lang="en-US" dirty="0"/>
-              <a:t>Time Complexity:</a:t>
-            </a:r>
-          </a:p>
-          <a:p>
-            <a:pPr lvl="1"/>
-            <a:r>
-              <a:rPr lang="en-US" dirty="0"/>
-              <a:t>O(</a:t>
-            </a:r>
-            <a:r>
-              <a:rPr lang="en-US" dirty="0" err="1"/>
-              <a:t>k</a:t>
-            </a:r>
-            <a:r>
-              <a:rPr lang="en-US" baseline="30000" dirty="0" err="1"/>
-              <a:t>n</a:t>
-            </a:r>
-            <a:r>
-              <a:rPr lang="en-US" dirty="0"/>
-              <a:t>)</a:t>
-            </a:r>
-          </a:p>
-          <a:p>
-            <a:r>
-              <a:rPr lang="en-US" dirty="0"/>
-              <a:t>Space Complexity:</a:t>
-            </a:r>
-          </a:p>
-          <a:p>
-            <a:pPr lvl="1"/>
-            <a:r>
-              <a:rPr lang="en-US" dirty="0"/>
-              <a:t>O(</a:t>
-            </a:r>
-            <a:r>
-              <a:rPr lang="en-US" dirty="0" err="1"/>
-              <a:t>k</a:t>
-            </a:r>
-            <a:r>
-              <a:rPr lang="en-US" baseline="30000" dirty="0" err="1"/>
-              <a:t>n</a:t>
-            </a:r>
-            <a:r>
-              <a:rPr lang="en-US" dirty="0"/>
-              <a:t>)</a:t>
-            </a:r>
-          </a:p>
-          <a:p>
-            <a:r>
-              <a:rPr lang="en-US" dirty="0"/>
-              <a:t>k being how many times the function recursively calls itself and n being the number of empty cells on the board.</a:t>
-            </a:r>
-          </a:p>
-          <a:p>
-            <a:pPr lvl="1"/>
-            <a:endParaRPr lang="en-US" dirty="0"/>
-          </a:p>
-        </p:txBody>
-      </p:sp>
-    </p:spTree>
-    <p:extLst>
-      <p:ext uri="{BB962C8B-B14F-4D97-AF65-F5344CB8AC3E}">
-        <p14:creationId xmlns:p14="http://schemas.microsoft.com/office/powerpoint/2010/main" val="3117972331"/>
-      </p:ext>
-    </p:extLst>
-  </p:cSld>
-  <p:clrMapOvr>
-    <a:masterClrMapping/>
-  </p:clrMapOvr>
-</p:sld>
-</file>
-
 <file path=ppt/slides/slide2.xml><?xml version="1.0" encoding="utf-8"?>
 <p:sld xmlns:a="http://schemas.openxmlformats.org/drawingml/2006/main" xmlns:r="http://schemas.openxmlformats.org/officeDocument/2006/relationships" xmlns:p="http://schemas.openxmlformats.org/presentationml/2006/main">
   <p:cSld>
@@ -8017,8 +8063,34 @@
         </p:nvSpPr>
         <p:spPr/>
         <p:txBody>
-          <a:bodyPr/>
-          <a:lstStyle/>
+          <a:bodyPr>
+            <a:normAutofit lnSpcReduction="10000"/>
+          </a:bodyPr>
+          <a:lstStyle/>
+          <a:p>
+            <a:r>
+              <a:rPr lang="en-US" dirty="0"/>
+              <a:t>Objective: Enhancing Understanding of Backtracking Algorithms and AI</a:t>
+            </a:r>
+          </a:p>
+          <a:p>
+            <a:r>
+              <a:rPr lang="en-US" dirty="0"/>
+              <a:t>Implementation: Focus on Backtracking Algorithm for Efficient Sudoku Puzzle Solving</a:t>
+            </a:r>
+          </a:p>
+          <a:p>
+            <a:r>
+              <a:rPr lang="en-US" dirty="0"/>
+              <a:t>Incorporation of Strategic Methods to Enhance Algorithm Effectiveness</a:t>
+            </a:r>
+          </a:p>
+          <a:p>
+            <a:r>
+              <a:rPr lang="en-US" dirty="0"/>
+              <a:t>Insights Gained: Integration of Logical Algorithms for Solution Determination and Optimization of Solution-Seeking Methodologies Using Generative Algorithms</a:t>
+            </a:r>
+          </a:p>
           <a:p>
             <a:endParaRPr lang="en-US" dirty="0"/>
           </a:p>
@@ -8059,7 +8131,7 @@
           <p:cNvPr id="2" name="Title 1">
             <a:extLst>
               <a:ext uri="{FF2B5EF4-FFF2-40B4-BE49-F238E27FC236}">
-                <a16:creationId xmlns:a16="http://schemas.microsoft.com/office/drawing/2014/main" id="{8446B410-A85F-4DF3-8D95-503619D583DC}"/>
+                <a16:creationId xmlns:a16="http://schemas.microsoft.com/office/drawing/2014/main" id="{1C0F531D-2E5A-48E6-A011-E7FCDA2FD82A}"/>
               </a:ext>
             </a:extLst>
           </p:cNvPr>
@@ -8067,27 +8139,33 @@
             <a:spLocks noGrp="1"/>
           </p:cNvSpPr>
           <p:nvPr>
-            <p:ph type="title"/>
-          </p:nvPr>
-        </p:nvSpPr>
-        <p:spPr/>
+            <p:ph type="ctrTitle"/>
+          </p:nvPr>
+        </p:nvSpPr>
+        <p:spPr>
+          <a:xfrm>
+            <a:off x="1202724" y="1380068"/>
+            <a:ext cx="10300299" cy="2616199"/>
+          </a:xfrm>
+        </p:spPr>
         <p:txBody>
           <a:bodyPr/>
           <a:lstStyle/>
           <a:p>
-            <a:r>
-              <a:rPr lang="en-US" dirty="0"/>
-              <a:t>Limitations</a:t>
-            </a:r>
-          </a:p>
-        </p:txBody>
-      </p:sp>
-      <p:sp>
-        <p:nvSpPr>
-          <p:cNvPr id="3" name="Content Placeholder 2">
+            <a:pPr algn="ctr"/>
+            <a:r>
+              <a:rPr lang="en-US" dirty="0"/>
+              <a:t>Discussion</a:t>
+            </a:r>
+          </a:p>
+        </p:txBody>
+      </p:sp>
+      <p:sp>
+        <p:nvSpPr>
+          <p:cNvPr id="3" name="Subtitle 2">
             <a:extLst>
               <a:ext uri="{FF2B5EF4-FFF2-40B4-BE49-F238E27FC236}">
-                <a16:creationId xmlns:a16="http://schemas.microsoft.com/office/drawing/2014/main" id="{22C49BB7-1795-4622-99D1-2F95ACCF6F73}"/>
+                <a16:creationId xmlns:a16="http://schemas.microsoft.com/office/drawing/2014/main" id="{4AB2CF1C-400D-4F1D-85F6-FC716B53C2B2}"/>
               </a:ext>
             </a:extLst>
           </p:cNvPr>
@@ -8095,7 +8173,7 @@
             <a:spLocks noGrp="1"/>
           </p:cNvSpPr>
           <p:nvPr>
-            <p:ph idx="1"/>
+            <p:ph type="subTitle" idx="1"/>
           </p:nvPr>
         </p:nvSpPr>
         <p:spPr/>
@@ -8110,7 +8188,7 @@
     </p:spTree>
     <p:extLst>
       <p:ext uri="{BB962C8B-B14F-4D97-AF65-F5344CB8AC3E}">
-        <p14:creationId xmlns:p14="http://schemas.microsoft.com/office/powerpoint/2010/main" val="119602023"/>
+        <p14:creationId xmlns:p14="http://schemas.microsoft.com/office/powerpoint/2010/main" val="1860840868"/>
       </p:ext>
     </p:extLst>
   </p:cSld>
@@ -8142,7 +8220,7 @@
           <p:cNvPr id="2" name="Title 1">
             <a:extLst>
               <a:ext uri="{FF2B5EF4-FFF2-40B4-BE49-F238E27FC236}">
-                <a16:creationId xmlns:a16="http://schemas.microsoft.com/office/drawing/2014/main" id="{1C0F531D-2E5A-48E6-A011-E7FCDA2FD82A}"/>
+                <a16:creationId xmlns:a16="http://schemas.microsoft.com/office/drawing/2014/main" id="{8580EFEF-5D64-41E2-BF19-44D99FD56027}"/>
               </a:ext>
             </a:extLst>
           </p:cNvPr>
@@ -8150,33 +8228,27 @@
             <a:spLocks noGrp="1"/>
           </p:cNvSpPr>
           <p:nvPr>
-            <p:ph type="ctrTitle"/>
-          </p:nvPr>
-        </p:nvSpPr>
-        <p:spPr>
-          <a:xfrm>
-            <a:off x="1202724" y="1380068"/>
-            <a:ext cx="10300299" cy="2616199"/>
-          </a:xfrm>
-        </p:spPr>
+            <p:ph type="title"/>
+          </p:nvPr>
+        </p:nvSpPr>
+        <p:spPr/>
         <p:txBody>
           <a:bodyPr/>
           <a:lstStyle/>
           <a:p>
-            <a:pPr algn="ctr"/>
-            <a:r>
-              <a:rPr lang="en-US" dirty="0"/>
-              <a:t>Conclusion</a:t>
-            </a:r>
-          </a:p>
-        </p:txBody>
-      </p:sp>
-      <p:sp>
-        <p:nvSpPr>
-          <p:cNvPr id="3" name="Subtitle 2">
+            <a:r>
+              <a:rPr lang="en-US" dirty="0"/>
+              <a:t>Efficiency Evaluation</a:t>
+            </a:r>
+          </a:p>
+        </p:txBody>
+      </p:sp>
+      <p:sp>
+        <p:nvSpPr>
+          <p:cNvPr id="3" name="Content Placeholder 2">
             <a:extLst>
               <a:ext uri="{FF2B5EF4-FFF2-40B4-BE49-F238E27FC236}">
-                <a16:creationId xmlns:a16="http://schemas.microsoft.com/office/drawing/2014/main" id="{4AB2CF1C-400D-4F1D-85F6-FC716B53C2B2}"/>
+                <a16:creationId xmlns:a16="http://schemas.microsoft.com/office/drawing/2014/main" id="{7563D280-FB6D-41D0-A29D-EFBD6657F5F6}"/>
               </a:ext>
             </a:extLst>
           </p:cNvPr>
@@ -8184,22 +8256,81 @@
             <a:spLocks noGrp="1"/>
           </p:cNvSpPr>
           <p:nvPr>
-            <p:ph type="subTitle" idx="1"/>
+            <p:ph idx="1"/>
           </p:nvPr>
         </p:nvSpPr>
         <p:spPr/>
         <p:txBody>
-          <a:bodyPr/>
-          <a:lstStyle/>
-          <a:p>
-            <a:endParaRPr lang="en-US"/>
+          <a:bodyPr>
+            <a:normAutofit/>
+          </a:bodyPr>
+          <a:lstStyle/>
+          <a:p>
+            <a:r>
+              <a:rPr lang="en-US" dirty="0"/>
+              <a:t>Time Complexity:</a:t>
+            </a:r>
+          </a:p>
+          <a:p>
+            <a:pPr lvl="1"/>
+            <a:r>
+              <a:rPr lang="en-US" dirty="0"/>
+              <a:t>O(</a:t>
+            </a:r>
+            <a:r>
+              <a:rPr lang="en-US" dirty="0" err="1"/>
+              <a:t>k</a:t>
+            </a:r>
+            <a:r>
+              <a:rPr lang="en-US" baseline="30000" dirty="0" err="1"/>
+              <a:t>n</a:t>
+            </a:r>
+            <a:r>
+              <a:rPr lang="en-US" dirty="0"/>
+              <a:t>)</a:t>
+            </a:r>
+          </a:p>
+          <a:p>
+            <a:r>
+              <a:rPr lang="en-US" dirty="0"/>
+              <a:t>Space Complexity:</a:t>
+            </a:r>
+          </a:p>
+          <a:p>
+            <a:pPr lvl="1"/>
+            <a:r>
+              <a:rPr lang="en-US" dirty="0"/>
+              <a:t>O(</a:t>
+            </a:r>
+            <a:r>
+              <a:rPr lang="en-US" dirty="0" err="1"/>
+              <a:t>k</a:t>
+            </a:r>
+            <a:r>
+              <a:rPr lang="en-US" baseline="30000" dirty="0" err="1"/>
+              <a:t>n</a:t>
+            </a:r>
+            <a:r>
+              <a:rPr lang="en-US" dirty="0"/>
+              <a:t>)</a:t>
+            </a:r>
+          </a:p>
+          <a:p>
+            <a:r>
+              <a:rPr lang="en-US" dirty="0"/>
+              <a:t>k being how many times the function recursively calls itself and n being the number of empty cells on the board.</a:t>
+            </a:r>
+          </a:p>
+          <a:p>
+            <a:pPr lvl="1"/>
+            <a:endParaRPr lang="en-US" dirty="0"/>
           </a:p>
         </p:txBody>
       </p:sp>
     </p:spTree>
     <p:extLst>
       <p:ext uri="{BB962C8B-B14F-4D97-AF65-F5344CB8AC3E}">
-        <p14:creationId xmlns:p14="http://schemas.microsoft.com/office/powerpoint/2010/main" val="869638968"/>
+        <p14:creationId xmlns:p14="http://schemas.microsoft.com/office/powerpoint/2010/main" val="3117972331"/>
       </p:ext>
     </p:extLst>
   </p:cSld>
@@ -8231,7 +8362,7 @@
           <p:cNvPr id="2" name="Title 1">
             <a:extLst>
               <a:ext uri="{FF2B5EF4-FFF2-40B4-BE49-F238E27FC236}">
-                <a16:creationId xmlns:a16="http://schemas.microsoft.com/office/drawing/2014/main" id="{B5854972-B376-4E58-A2A1-A73024262163}"/>
+                <a16:creationId xmlns:a16="http://schemas.microsoft.com/office/drawing/2014/main" id="{8446B410-A85F-4DF3-8D95-503619D583DC}"/>
               </a:ext>
             </a:extLst>
           </p:cNvPr>
@@ -8249,7 +8380,7 @@
           <a:p>
             <a:r>
               <a:rPr lang="en-US" dirty="0"/>
-              <a:t>Summary of Findings</a:t>
+              <a:t>Limitations</a:t>
             </a:r>
           </a:p>
         </p:txBody>
@@ -8259,7 +8390,7 @@
           <p:cNvPr id="3" name="Content Placeholder 2">
             <a:extLst>
               <a:ext uri="{FF2B5EF4-FFF2-40B4-BE49-F238E27FC236}">
-                <a16:creationId xmlns:a16="http://schemas.microsoft.com/office/drawing/2014/main" id="{C6CBC30A-7494-45A4-8CFA-B2940D92BFFA}"/>
+                <a16:creationId xmlns:a16="http://schemas.microsoft.com/office/drawing/2014/main" id="{22C49BB7-1795-4622-99D1-2F95ACCF6F73}"/>
               </a:ext>
             </a:extLst>
           </p:cNvPr>
@@ -8272,17 +8403,58 @@
         </p:nvSpPr>
         <p:spPr/>
         <p:txBody>
-          <a:bodyPr/>
-          <a:lstStyle/>
-          <a:p>
-            <a:endParaRPr lang="en-US"/>
+          <a:bodyPr>
+            <a:normAutofit lnSpcReduction="10000"/>
+          </a:bodyPr>
+          <a:lstStyle/>
+          <a:p>
+            <a:r>
+              <a:rPr lang="en-US" dirty="0"/>
+              <a:t>Exclusion of Complex Strategies:</a:t>
+            </a:r>
+          </a:p>
+          <a:p>
+            <a:pPr lvl="1"/>
+            <a:r>
+              <a:rPr lang="en-US" dirty="0"/>
+              <a:t>Some solving strategies are overly complex, posing risk of increased solving time.</a:t>
+            </a:r>
+          </a:p>
+          <a:p>
+            <a:r>
+              <a:rPr lang="en-US" dirty="0"/>
+              <a:t>Effectiveness:</a:t>
+            </a:r>
+          </a:p>
+          <a:p>
+            <a:pPr lvl="1"/>
+            <a:r>
+              <a:rPr lang="en-US" dirty="0"/>
+              <a:t>Not all strategies may be effective for all puzzles.</a:t>
+            </a:r>
+          </a:p>
+          <a:p>
+            <a:r>
+              <a:rPr lang="en-US" dirty="0"/>
+              <a:t>Backtracking Algorithm Workload:</a:t>
+            </a:r>
+          </a:p>
+          <a:p>
+            <a:pPr lvl="1"/>
+            <a:r>
+              <a:rPr lang="en-US" dirty="0"/>
+              <a:t>Despite employed strategies, backtracking algorithm remains primary workload carrier.</a:t>
+            </a:r>
+          </a:p>
+          <a:p>
+            <a:endParaRPr lang="en-US" dirty="0"/>
           </a:p>
         </p:txBody>
       </p:sp>
     </p:spTree>
     <p:extLst>
       <p:ext uri="{BB962C8B-B14F-4D97-AF65-F5344CB8AC3E}">
-        <p14:creationId xmlns:p14="http://schemas.microsoft.com/office/powerpoint/2010/main" val="937337035"/>
+        <p14:creationId xmlns:p14="http://schemas.microsoft.com/office/powerpoint/2010/main" val="119602023"/>
       </p:ext>
     </p:extLst>
   </p:cSld>
@@ -8314,6 +8486,178 @@
           <p:cNvPr id="2" name="Title 1">
             <a:extLst>
               <a:ext uri="{FF2B5EF4-FFF2-40B4-BE49-F238E27FC236}">
+                <a16:creationId xmlns:a16="http://schemas.microsoft.com/office/drawing/2014/main" id="{1C0F531D-2E5A-48E6-A011-E7FCDA2FD82A}"/>
+              </a:ext>
+            </a:extLst>
+          </p:cNvPr>
+          <p:cNvSpPr>
+            <a:spLocks noGrp="1"/>
+          </p:cNvSpPr>
+          <p:nvPr>
+            <p:ph type="ctrTitle"/>
+          </p:nvPr>
+        </p:nvSpPr>
+        <p:spPr>
+          <a:xfrm>
+            <a:off x="1202724" y="1380068"/>
+            <a:ext cx="10300299" cy="2616199"/>
+          </a:xfrm>
+        </p:spPr>
+        <p:txBody>
+          <a:bodyPr/>
+          <a:lstStyle/>
+          <a:p>
+            <a:pPr algn="ctr"/>
+            <a:r>
+              <a:rPr lang="en-US" dirty="0"/>
+              <a:t>Conclusion</a:t>
+            </a:r>
+          </a:p>
+        </p:txBody>
+      </p:sp>
+      <p:sp>
+        <p:nvSpPr>
+          <p:cNvPr id="3" name="Subtitle 2">
+            <a:extLst>
+              <a:ext uri="{FF2B5EF4-FFF2-40B4-BE49-F238E27FC236}">
+                <a16:creationId xmlns:a16="http://schemas.microsoft.com/office/drawing/2014/main" id="{4AB2CF1C-400D-4F1D-85F6-FC716B53C2B2}"/>
+              </a:ext>
+            </a:extLst>
+          </p:cNvPr>
+          <p:cNvSpPr>
+            <a:spLocks noGrp="1"/>
+          </p:cNvSpPr>
+          <p:nvPr>
+            <p:ph type="subTitle" idx="1"/>
+          </p:nvPr>
+        </p:nvSpPr>
+        <p:spPr/>
+        <p:txBody>
+          <a:bodyPr/>
+          <a:lstStyle/>
+          <a:p>
+            <a:endParaRPr lang="en-US"/>
+          </a:p>
+        </p:txBody>
+      </p:sp>
+    </p:spTree>
+    <p:extLst>
+      <p:ext uri="{BB962C8B-B14F-4D97-AF65-F5344CB8AC3E}">
+        <p14:creationId xmlns:p14="http://schemas.microsoft.com/office/powerpoint/2010/main" val="869638968"/>
+      </p:ext>
+    </p:extLst>
+  </p:cSld>
+  <p:clrMapOvr>
+    <a:masterClrMapping/>
+  </p:clrMapOvr>
+</p:sld>
+</file>
+
+<file path=ppt/slides/slide24.xml><?xml version="1.0" encoding="utf-8"?>
+<p:sld xmlns:a="http://schemas.openxmlformats.org/drawingml/2006/main" xmlns:r="http://schemas.openxmlformats.org/officeDocument/2006/relationships" xmlns:p="http://schemas.openxmlformats.org/presentationml/2006/main">
+  <p:cSld>
+    <p:spTree>
+      <p:nvGrpSpPr>
+        <p:cNvPr id="1" name=""/>
+        <p:cNvGrpSpPr/>
+        <p:nvPr/>
+      </p:nvGrpSpPr>
+      <p:grpSpPr>
+        <a:xfrm>
+          <a:off x="0" y="0"/>
+          <a:ext cx="0" cy="0"/>
+          <a:chOff x="0" y="0"/>
+          <a:chExt cx="0" cy="0"/>
+        </a:xfrm>
+      </p:grpSpPr>
+      <p:sp>
+        <p:nvSpPr>
+          <p:cNvPr id="2" name="Title 1">
+            <a:extLst>
+              <a:ext uri="{FF2B5EF4-FFF2-40B4-BE49-F238E27FC236}">
+                <a16:creationId xmlns:a16="http://schemas.microsoft.com/office/drawing/2014/main" id="{B5854972-B376-4E58-A2A1-A73024262163}"/>
+              </a:ext>
+            </a:extLst>
+          </p:cNvPr>
+          <p:cNvSpPr>
+            <a:spLocks noGrp="1"/>
+          </p:cNvSpPr>
+          <p:nvPr>
+            <p:ph type="title"/>
+          </p:nvPr>
+        </p:nvSpPr>
+        <p:spPr/>
+        <p:txBody>
+          <a:bodyPr/>
+          <a:lstStyle/>
+          <a:p>
+            <a:r>
+              <a:rPr lang="en-US" dirty="0"/>
+              <a:t>Summary of Findings</a:t>
+            </a:r>
+          </a:p>
+        </p:txBody>
+      </p:sp>
+      <p:sp>
+        <p:nvSpPr>
+          <p:cNvPr id="3" name="Content Placeholder 2">
+            <a:extLst>
+              <a:ext uri="{FF2B5EF4-FFF2-40B4-BE49-F238E27FC236}">
+                <a16:creationId xmlns:a16="http://schemas.microsoft.com/office/drawing/2014/main" id="{C6CBC30A-7494-45A4-8CFA-B2940D92BFFA}"/>
+              </a:ext>
+            </a:extLst>
+          </p:cNvPr>
+          <p:cNvSpPr>
+            <a:spLocks noGrp="1"/>
+          </p:cNvSpPr>
+          <p:nvPr>
+            <p:ph idx="1"/>
+          </p:nvPr>
+        </p:nvSpPr>
+        <p:spPr/>
+        <p:txBody>
+          <a:bodyPr/>
+          <a:lstStyle/>
+          <a:p>
+            <a:endParaRPr lang="en-US"/>
+          </a:p>
+        </p:txBody>
+      </p:sp>
+    </p:spTree>
+    <p:extLst>
+      <p:ext uri="{BB962C8B-B14F-4D97-AF65-F5344CB8AC3E}">
+        <p14:creationId xmlns:p14="http://schemas.microsoft.com/office/powerpoint/2010/main" val="937337035"/>
+      </p:ext>
+    </p:extLst>
+  </p:cSld>
+  <p:clrMapOvr>
+    <a:masterClrMapping/>
+  </p:clrMapOvr>
+</p:sld>
+</file>
+
+<file path=ppt/slides/slide25.xml><?xml version="1.0" encoding="utf-8"?>
+<p:sld xmlns:a="http://schemas.openxmlformats.org/drawingml/2006/main" xmlns:r="http://schemas.openxmlformats.org/officeDocument/2006/relationships" xmlns:p="http://schemas.openxmlformats.org/presentationml/2006/main">
+  <p:cSld>
+    <p:spTree>
+      <p:nvGrpSpPr>
+        <p:cNvPr id="1" name=""/>
+        <p:cNvGrpSpPr/>
+        <p:nvPr/>
+      </p:nvGrpSpPr>
+      <p:grpSpPr>
+        <a:xfrm>
+          <a:off x="0" y="0"/>
+          <a:ext cx="0" cy="0"/>
+          <a:chOff x="0" y="0"/>
+          <a:chExt cx="0" cy="0"/>
+        </a:xfrm>
+      </p:grpSpPr>
+      <p:sp>
+        <p:nvSpPr>
+          <p:cNvPr id="2" name="Title 1">
+            <a:extLst>
+              <a:ext uri="{FF2B5EF4-FFF2-40B4-BE49-F238E27FC236}">
                 <a16:creationId xmlns:a16="http://schemas.microsoft.com/office/drawing/2014/main" id="{F3AF062E-AC73-4B71-A6FE-033D6827A1FB}"/>
               </a:ext>
             </a:extLst>
@@ -8355,10 +8699,58 @@
         </p:nvSpPr>
         <p:spPr/>
         <p:txBody>
-          <a:bodyPr/>
-          <a:lstStyle/>
-          <a:p>
-            <a:endParaRPr lang="en-US"/>
+          <a:bodyPr>
+            <a:normAutofit fontScale="92500" lnSpcReduction="20000"/>
+          </a:bodyPr>
+          <a:lstStyle/>
+          <a:p>
+            <a:r>
+              <a:rPr lang="en-US" dirty="0"/>
+              <a:t>Display:</a:t>
+            </a:r>
+          </a:p>
+          <a:p>
+            <a:pPr lvl="1"/>
+            <a:r>
+              <a:rPr lang="en-US" dirty="0"/>
+              <a:t>Refinement of webpages.</a:t>
+            </a:r>
+          </a:p>
+          <a:p>
+            <a:pPr lvl="1"/>
+            <a:r>
+              <a:rPr lang="en-US" dirty="0"/>
+              <a:t>Strengthening client-server connection.</a:t>
+            </a:r>
+          </a:p>
+          <a:p>
+            <a:r>
+              <a:rPr lang="en-US" dirty="0"/>
+              <a:t>Solver:</a:t>
+            </a:r>
+          </a:p>
+          <a:p>
+            <a:pPr lvl="1"/>
+            <a:r>
+              <a:rPr lang="en-US" dirty="0"/>
+              <a:t>Incorporation of additional solving strategies.</a:t>
+            </a:r>
+          </a:p>
+          <a:p>
+            <a:r>
+              <a:rPr lang="en-US" dirty="0"/>
+              <a:t>Integration:</a:t>
+            </a:r>
+          </a:p>
+          <a:p>
+            <a:pPr lvl="1"/>
+            <a:r>
+              <a:rPr lang="en-US" dirty="0"/>
+              <a:t>Implementation of mechanism to determine optimal transition point between different solving methods for increased efficiency and effectiveness.</a:t>
+            </a:r>
+          </a:p>
+          <a:p>
+            <a:endParaRPr lang="en-US" dirty="0"/>
           </a:p>
         </p:txBody>
       </p:sp>
@@ -8375,7 +8767,7 @@
 </p:sld>
 </file>
 
-<file path=ppt/slides/slide24.xml><?xml version="1.0" encoding="utf-8"?>
+<file path=ppt/slides/slide26.xml><?xml version="1.0" encoding="utf-8"?>
 <p:sld xmlns:a="http://schemas.openxmlformats.org/drawingml/2006/main" xmlns:r="http://schemas.openxmlformats.org/officeDocument/2006/relationships" xmlns:p="http://schemas.openxmlformats.org/presentationml/2006/main">
   <p:cSld>
     <p:spTree>

</xml_diff>

<commit_message>
More Updates to Report and Presentation
</commit_message>
<xml_diff>
--- a/AI TermProject Presentation.pptx
+++ b/AI TermProject Presentation.pptx
@@ -7042,7 +7042,7 @@
         <p:spPr/>
         <p:txBody>
           <a:bodyPr>
-            <a:normAutofit fontScale="92500" lnSpcReduction="10000"/>
+            <a:normAutofit/>
           </a:bodyPr>
           <a:lstStyle/>
           <a:p>
@@ -7130,16 +7130,6 @@
               <a:rPr lang="en-US" dirty="0" err="1"/>
               <a:t>ms</a:t>
             </a:r>
-            <a:endParaRPr lang="en-US" dirty="0"/>
-          </a:p>
-          <a:p>
-            <a:r>
-              <a:rPr lang="en-US" dirty="0"/>
-              <a:t>Difficulty:</a:t>
-            </a:r>
-          </a:p>
-          <a:p>
-            <a:pPr lvl="1"/>
             <a:endParaRPr lang="en-US" dirty="0"/>
           </a:p>
         </p:txBody>
@@ -7292,7 +7282,7 @@
         <p:spPr/>
         <p:txBody>
           <a:bodyPr>
-            <a:normAutofit fontScale="92500" lnSpcReduction="10000"/>
+            <a:normAutofit/>
           </a:bodyPr>
           <a:lstStyle/>
           <a:p>
@@ -7378,12 +7368,6 @@
               <a:t>ms</a:t>
             </a:r>
             <a:endParaRPr lang="en-US" dirty="0"/>
-          </a:p>
-          <a:p>
-            <a:r>
-              <a:rPr lang="en-US" dirty="0"/>
-              <a:t>Difficulty:</a:t>
-            </a:r>
           </a:p>
           <a:p>
             <a:pPr lvl="1"/>
@@ -7539,7 +7523,7 @@
         <p:spPr/>
         <p:txBody>
           <a:bodyPr>
-            <a:normAutofit fontScale="92500" lnSpcReduction="10000"/>
+            <a:normAutofit/>
           </a:bodyPr>
           <a:lstStyle/>
           <a:p>
@@ -7625,12 +7609,6 @@
               <a:t>ms</a:t>
             </a:r>
             <a:endParaRPr lang="en-US" dirty="0"/>
-          </a:p>
-          <a:p>
-            <a:r>
-              <a:rPr lang="en-US" dirty="0"/>
-              <a:t>Difficulty:</a:t>
-            </a:r>
           </a:p>
           <a:p>
             <a:pPr lvl="1"/>
@@ -7786,7 +7764,7 @@
         <p:spPr/>
         <p:txBody>
           <a:bodyPr>
-            <a:normAutofit fontScale="92500" lnSpcReduction="10000"/>
+            <a:normAutofit/>
           </a:bodyPr>
           <a:lstStyle/>
           <a:p>
@@ -7841,12 +7819,6 @@
             <a:r>
               <a:rPr lang="en-US" dirty="0"/>
               <a:t>Average Time: 1.8 s</a:t>
-            </a:r>
-          </a:p>
-          <a:p>
-            <a:r>
-              <a:rPr lang="en-US" dirty="0"/>
-              <a:t>Difficulty:</a:t>
             </a:r>
           </a:p>
           <a:p>
@@ -8117,7 +8089,7 @@
         </p:spPr>
         <p:txBody>
           <a:bodyPr>
-            <a:normAutofit fontScale="92500" lnSpcReduction="10000"/>
+            <a:normAutofit/>
           </a:bodyPr>
           <a:lstStyle/>
           <a:p>
@@ -8202,16 +8174,6 @@
               <a:rPr lang="en-US" dirty="0" err="1"/>
               <a:t>ms</a:t>
             </a:r>
-            <a:endParaRPr lang="en-US" dirty="0"/>
-          </a:p>
-          <a:p>
-            <a:r>
-              <a:rPr lang="en-US" dirty="0"/>
-              <a:t>Difficulty:</a:t>
-            </a:r>
-          </a:p>
-          <a:p>
-            <a:pPr lvl="1"/>
             <a:endParaRPr lang="en-US" dirty="0"/>
           </a:p>
         </p:txBody>

</xml_diff>